<commit_message>
Remove RestSharp as a dependency
</commit_message>
<xml_diff>
--- a/WireMockNetWorkshop.pptx
+++ b/WireMockNetWorkshop.pptx
@@ -6,7 +6,7 @@
     <p:sldMasterId id="2147483660" r:id="rId2"/>
   </p:sldMasterIdLst>
   <p:notesMasterIdLst>
-    <p:notesMasterId r:id="rId50"/>
+    <p:notesMasterId r:id="rId49"/>
   </p:notesMasterIdLst>
   <p:sldIdLst>
     <p:sldId id="256" r:id="rId3"/>
@@ -42,20 +42,19 @@
     <p:sldId id="1098" r:id="rId33"/>
     <p:sldId id="1099" r:id="rId34"/>
     <p:sldId id="1100" r:id="rId35"/>
-    <p:sldId id="421" r:id="rId36"/>
-    <p:sldId id="1101" r:id="rId37"/>
-    <p:sldId id="767" r:id="rId38"/>
-    <p:sldId id="322" r:id="rId39"/>
-    <p:sldId id="716" r:id="rId40"/>
-    <p:sldId id="323" r:id="rId41"/>
-    <p:sldId id="1102" r:id="rId42"/>
-    <p:sldId id="1086" r:id="rId43"/>
-    <p:sldId id="1044" r:id="rId44"/>
-    <p:sldId id="1104" r:id="rId45"/>
-    <p:sldId id="424" r:id="rId46"/>
-    <p:sldId id="426" r:id="rId47"/>
-    <p:sldId id="1105" r:id="rId48"/>
-    <p:sldId id="747" r:id="rId49"/>
+    <p:sldId id="1101" r:id="rId36"/>
+    <p:sldId id="767" r:id="rId37"/>
+    <p:sldId id="322" r:id="rId38"/>
+    <p:sldId id="716" r:id="rId39"/>
+    <p:sldId id="323" r:id="rId40"/>
+    <p:sldId id="1102" r:id="rId41"/>
+    <p:sldId id="1086" r:id="rId42"/>
+    <p:sldId id="1044" r:id="rId43"/>
+    <p:sldId id="1104" r:id="rId44"/>
+    <p:sldId id="424" r:id="rId45"/>
+    <p:sldId id="426" r:id="rId46"/>
+    <p:sldId id="1105" r:id="rId47"/>
+    <p:sldId id="747" r:id="rId48"/>
   </p:sldIdLst>
   <p:sldSz cx="12192000" cy="6858000"/>
   <p:notesSz cx="6858000" cy="9144000"/>
@@ -308,7 +307,7 @@
             <a:fld id="{933C1985-CC60-4502-8ECC-8A39609F1E28}" type="datetime1">
               <a:rPr lang="nl-NL"/>
               <a:pPr lvl="0"/>
-              <a:t>3-2-2023</a:t>
+              <a:t>30-3-2023</a:t>
             </a:fld>
             <a:endParaRPr lang="nl-NL"/>
           </a:p>
@@ -1689,7 +1688,7 @@
                 <a:tabLst/>
                 <a:defRPr/>
               </a:pPr>
-              <a:t>35</a:t>
+              <a:t>34</a:t>
             </a:fld>
             <a:endParaRPr kumimoji="0" lang="en-US" sz="1200" b="0" i="0" u="none" strike="noStrike" kern="1200" cap="none" spc="0" normalizeH="0" baseline="0" noProof="0">
               <a:ln>
@@ -1846,7 +1845,7 @@
                 <a:tabLst/>
                 <a:defRPr/>
               </a:pPr>
-              <a:t>36</a:t>
+              <a:t>35</a:t>
             </a:fld>
             <a:endParaRPr kumimoji="0" lang="nl-NL" sz="1200" b="0" i="0" u="none" strike="noStrike" kern="1200" cap="none" spc="0" normalizeH="0" baseline="0" noProof="0">
               <a:ln>
@@ -1995,7 +1994,7 @@
                 <a:tabLst/>
                 <a:defRPr/>
               </a:pPr>
-              <a:t>40</a:t>
+              <a:t>39</a:t>
             </a:fld>
             <a:endParaRPr kumimoji="0" lang="en-US" sz="1200" b="0" i="0" u="none" strike="noStrike" kern="1200" cap="none" spc="0" normalizeH="0" baseline="0" noProof="0">
               <a:ln>
@@ -2152,7 +2151,7 @@
                 <a:tabLst/>
                 <a:defRPr/>
               </a:pPr>
-              <a:t>41</a:t>
+              <a:t>40</a:t>
             </a:fld>
             <a:endParaRPr kumimoji="0" lang="nl-NL" sz="1200" b="0" i="0" u="none" strike="noStrike" kern="1200" cap="none" spc="0" normalizeH="0" baseline="0" noProof="0">
               <a:ln>
@@ -2301,7 +2300,7 @@
                 <a:tabLst/>
                 <a:defRPr/>
               </a:pPr>
-              <a:t>46</a:t>
+              <a:t>45</a:t>
             </a:fld>
             <a:endParaRPr kumimoji="0" lang="en-US" sz="1200" b="0" i="0" u="none" strike="noStrike" kern="1200" cap="none" spc="0" normalizeH="0" baseline="0" noProof="0">
               <a:ln>
@@ -2585,7 +2584,7 @@
                 <a:tabLst/>
                 <a:defRPr/>
               </a:pPr>
-              <a:t>47</a:t>
+              <a:t>46</a:t>
             </a:fld>
             <a:endParaRPr kumimoji="0" lang="nl-NL" sz="1200" b="0" i="0" u="none" strike="noStrike" kern="1200" cap="none" spc="0" normalizeH="0" baseline="0" noProof="0">
               <a:ln>
@@ -3906,7 +3905,7 @@
             <a:fld id="{19D221E3-8E68-4F1C-A103-A0B6C8B9662E}" type="datetime1">
               <a:rPr lang="nl-NL"/>
               <a:pPr lvl="0"/>
-              <a:t>3-2-2023</a:t>
+              <a:t>30-3-2023</a:t>
             </a:fld>
             <a:endParaRPr lang="nl-NL"/>
           </a:p>
@@ -4143,7 +4142,7 @@
             <a:fld id="{822E0BF5-BE88-44A4-BA94-982271F97C3D}" type="datetime1">
               <a:rPr lang="nl-NL"/>
               <a:pPr lvl="0"/>
-              <a:t>3-2-2023</a:t>
+              <a:t>30-3-2023</a:t>
             </a:fld>
             <a:endParaRPr lang="nl-NL"/>
           </a:p>
@@ -4389,7 +4388,7 @@
             <a:fld id="{B9232680-D045-46AA-BEF7-C3F631B40446}" type="datetime1">
               <a:rPr lang="nl-NL"/>
               <a:pPr lvl="0"/>
-              <a:t>3-2-2023</a:t>
+              <a:t>30-3-2023</a:t>
             </a:fld>
             <a:endParaRPr lang="nl-NL"/>
           </a:p>
@@ -4602,7 +4601,7 @@
           <a:p>
             <a:fld id="{EF2786E2-A2AD-407F-A096-CEC047B7C616}" type="datetimeFigureOut">
               <a:rPr lang="nl-NL" smtClean="0"/>
-              <a:t>3-2-2023</a:t>
+              <a:t>30-3-2023</a:t>
             </a:fld>
             <a:endParaRPr lang="nl-NL"/>
           </a:p>
@@ -4772,7 +4771,7 @@
           <a:p>
             <a:fld id="{EF2786E2-A2AD-407F-A096-CEC047B7C616}" type="datetimeFigureOut">
               <a:rPr lang="nl-NL" smtClean="0"/>
-              <a:t>3-2-2023</a:t>
+              <a:t>30-3-2023</a:t>
             </a:fld>
             <a:endParaRPr lang="nl-NL"/>
           </a:p>
@@ -5018,7 +5017,7 @@
           <a:p>
             <a:fld id="{EF2786E2-A2AD-407F-A096-CEC047B7C616}" type="datetimeFigureOut">
               <a:rPr lang="nl-NL" smtClean="0"/>
-              <a:t>3-2-2023</a:t>
+              <a:t>30-3-2023</a:t>
             </a:fld>
             <a:endParaRPr lang="nl-NL"/>
           </a:p>
@@ -5250,7 +5249,7 @@
           <a:p>
             <a:fld id="{EF2786E2-A2AD-407F-A096-CEC047B7C616}" type="datetimeFigureOut">
               <a:rPr lang="nl-NL" smtClean="0"/>
-              <a:t>3-2-2023</a:t>
+              <a:t>30-3-2023</a:t>
             </a:fld>
             <a:endParaRPr lang="nl-NL"/>
           </a:p>
@@ -5617,7 +5616,7 @@
           <a:p>
             <a:fld id="{EF2786E2-A2AD-407F-A096-CEC047B7C616}" type="datetimeFigureOut">
               <a:rPr lang="nl-NL" smtClean="0"/>
-              <a:t>3-2-2023</a:t>
+              <a:t>30-3-2023</a:t>
             </a:fld>
             <a:endParaRPr lang="nl-NL"/>
           </a:p>
@@ -5735,7 +5734,7 @@
           <a:p>
             <a:fld id="{EF2786E2-A2AD-407F-A096-CEC047B7C616}" type="datetimeFigureOut">
               <a:rPr lang="nl-NL" smtClean="0"/>
-              <a:t>3-2-2023</a:t>
+              <a:t>30-3-2023</a:t>
             </a:fld>
             <a:endParaRPr lang="nl-NL"/>
           </a:p>
@@ -5830,7 +5829,7 @@
           <a:p>
             <a:fld id="{EF2786E2-A2AD-407F-A096-CEC047B7C616}" type="datetimeFigureOut">
               <a:rPr lang="nl-NL" smtClean="0"/>
-              <a:t>3-2-2023</a:t>
+              <a:t>30-3-2023</a:t>
             </a:fld>
             <a:endParaRPr lang="nl-NL"/>
           </a:p>
@@ -6107,7 +6106,7 @@
           <a:p>
             <a:fld id="{EF2786E2-A2AD-407F-A096-CEC047B7C616}" type="datetimeFigureOut">
               <a:rPr lang="nl-NL" smtClean="0"/>
-              <a:t>3-2-2023</a:t>
+              <a:t>30-3-2023</a:t>
             </a:fld>
             <a:endParaRPr lang="nl-NL"/>
           </a:p>
@@ -6322,7 +6321,7 @@
             <a:fld id="{74E63D54-33BC-47E5-ADB1-BB0B7298DA8F}" type="datetime1">
               <a:rPr lang="nl-NL"/>
               <a:pPr lvl="0"/>
-              <a:t>3-2-2023</a:t>
+              <a:t>30-3-2023</a:t>
             </a:fld>
             <a:endParaRPr lang="nl-NL"/>
           </a:p>
@@ -6597,7 +6596,7 @@
           <a:p>
             <a:fld id="{EF2786E2-A2AD-407F-A096-CEC047B7C616}" type="datetimeFigureOut">
               <a:rPr lang="nl-NL" smtClean="0"/>
-              <a:t>3-2-2023</a:t>
+              <a:t>30-3-2023</a:t>
             </a:fld>
             <a:endParaRPr lang="nl-NL"/>
           </a:p>
@@ -6767,7 +6766,7 @@
           <a:p>
             <a:fld id="{EF2786E2-A2AD-407F-A096-CEC047B7C616}" type="datetimeFigureOut">
               <a:rPr lang="nl-NL" smtClean="0"/>
-              <a:t>3-2-2023</a:t>
+              <a:t>30-3-2023</a:t>
             </a:fld>
             <a:endParaRPr lang="nl-NL"/>
           </a:p>
@@ -6947,7 +6946,7 @@
           <a:p>
             <a:fld id="{EF2786E2-A2AD-407F-A096-CEC047B7C616}" type="datetimeFigureOut">
               <a:rPr lang="nl-NL" smtClean="0"/>
-              <a:t>3-2-2023</a:t>
+              <a:t>30-3-2023</a:t>
             </a:fld>
             <a:endParaRPr lang="nl-NL"/>
           </a:p>
@@ -7136,7 +7135,7 @@
             <a:fld id="{30925ABE-D3D0-404A-A142-4AD3A33711F1}" type="datetime1">
               <a:rPr lang="nl-NL"/>
               <a:pPr lvl="0"/>
-              <a:t>3-2-2023</a:t>
+              <a:t>30-3-2023</a:t>
             </a:fld>
             <a:endParaRPr lang="nl-NL"/>
           </a:p>
@@ -7456,7 +7455,7 @@
             <a:fld id="{CF7C870A-C5CE-4B9C-8879-AA59D721C7B0}" type="datetime1">
               <a:rPr lang="nl-NL"/>
               <a:pPr lvl="0"/>
-              <a:t>3-2-2023</a:t>
+              <a:t>30-3-2023</a:t>
             </a:fld>
             <a:endParaRPr lang="nl-NL"/>
           </a:p>
@@ -7860,7 +7859,7 @@
             <a:fld id="{9B8CBA01-D750-4027-AD4F-F8BBD96EFE00}" type="datetime1">
               <a:rPr lang="nl-NL"/>
               <a:pPr lvl="0"/>
-              <a:t>3-2-2023</a:t>
+              <a:t>30-3-2023</a:t>
             </a:fld>
             <a:endParaRPr lang="nl-NL"/>
           </a:p>
@@ -8023,7 +8022,7 @@
             <a:fld id="{F094EFB8-CC71-4E7E-9D6F-4AF06728B1E2}" type="datetime1">
               <a:rPr lang="nl-NL"/>
               <a:pPr lvl="0"/>
-              <a:t>3-2-2023</a:t>
+              <a:t>30-3-2023</a:t>
             </a:fld>
             <a:endParaRPr lang="nl-NL"/>
           </a:p>
@@ -8151,7 +8150,7 @@
             <a:fld id="{8B2D0485-9F03-42A6-AEAF-640E1E801316}" type="datetime1">
               <a:rPr lang="nl-NL"/>
               <a:pPr lvl="0"/>
-              <a:t>3-2-2023</a:t>
+              <a:t>30-3-2023</a:t>
             </a:fld>
             <a:endParaRPr lang="nl-NL"/>
           </a:p>
@@ -8436,7 +8435,7 @@
             <a:fld id="{7E16F5C2-4DDC-41E9-9E83-12B283FFD3EC}" type="datetime1">
               <a:rPr lang="nl-NL"/>
               <a:pPr lvl="0"/>
-              <a:t>3-2-2023</a:t>
+              <a:t>30-3-2023</a:t>
             </a:fld>
             <a:endParaRPr lang="nl-NL"/>
           </a:p>
@@ -8678,7 +8677,7 @@
             <a:fld id="{787BCDFB-3AD3-4B04-8CEB-D3DE0C540ABF}" type="datetime1">
               <a:rPr lang="nl-NL"/>
               <a:pPr lvl="0"/>
-              <a:t>3-2-2023</a:t>
+              <a:t>30-3-2023</a:t>
             </a:fld>
             <a:endParaRPr lang="nl-NL"/>
           </a:p>
@@ -8961,7 +8960,7 @@
             <a:fld id="{DE0E4D8D-E244-449F-9212-68A908B9804D}" type="datetime1">
               <a:rPr lang="nl-NL"/>
               <a:pPr lvl="0"/>
-              <a:t>3-2-2023</a:t>
+              <a:t>30-3-2023</a:t>
             </a:fld>
             <a:endParaRPr lang="nl-NL"/>
           </a:p>
@@ -9566,7 +9565,7 @@
           <a:p>
             <a:fld id="{EF2786E2-A2AD-407F-A096-CEC047B7C616}" type="datetimeFigureOut">
               <a:rPr lang="nl-NL" smtClean="0"/>
-              <a:t>3-2-2023</a:t>
+              <a:t>30-3-2023</a:t>
             </a:fld>
             <a:endParaRPr lang="nl-NL"/>
           </a:p>
@@ -21386,7 +21385,7 @@
                 <a:latin typeface="Courier New" pitchFamily="49"/>
                 <a:cs typeface="Courier New" pitchFamily="49"/>
               </a:rPr>
-              <a:t>https://github.com/basdijkstra/restsharp-workshop</a:t>
+              <a:t>https://github.com/basdijkstra/wiremock-net-workshop</a:t>
             </a:r>
           </a:p>
         </p:txBody>
@@ -23812,7 +23811,7 @@
           <p:cNvPr id="2" name="Title 1">
             <a:extLst>
               <a:ext uri="{FF2B5EF4-FFF2-40B4-BE49-F238E27FC236}">
-                <a16:creationId xmlns:a16="http://schemas.microsoft.com/office/drawing/2014/main" id="{2533E8A6-631F-42C1-A468-436CC60BE397}"/>
+                <a16:creationId xmlns:a16="http://schemas.microsoft.com/office/drawing/2014/main" id="{C0B4D458-4D33-4286-AFEF-1B613A4DDEAA}"/>
               </a:ext>
             </a:extLst>
           </p:cNvPr>
@@ -23823,7 +23822,12 @@
             <p:ph type="title"/>
           </p:nvPr>
         </p:nvSpPr>
-        <p:spPr/>
+        <p:spPr>
+          <a:xfrm>
+            <a:off x="838200" y="111129"/>
+            <a:ext cx="10515600" cy="721991"/>
+          </a:xfrm>
+        </p:spPr>
         <p:txBody>
           <a:bodyPr/>
           <a:lstStyle/>
@@ -23837,8 +23841,15 @@
                 <a:latin typeface="Courier New" pitchFamily="49"/>
                 <a:cs typeface="Courier New" pitchFamily="49"/>
               </a:rPr>
-              <a:t>Example: bad responses (Java)</a:t>
-            </a:r>
+              <a:t>Now it’s your turn!</a:t>
+            </a:r>
+            <a:endParaRPr lang="nl-NL" dirty="0">
+              <a:solidFill>
+                <a:srgbClr val="00FF00"/>
+              </a:solidFill>
+              <a:latin typeface="Courier New" pitchFamily="49"/>
+              <a:cs typeface="Courier New" pitchFamily="49"/>
+            </a:endParaRPr>
           </a:p>
         </p:txBody>
       </p:sp>
@@ -23847,7 +23858,7 @@
           <p:cNvPr id="3" name="Content Placeholder 2">
             <a:extLst>
               <a:ext uri="{FF2B5EF4-FFF2-40B4-BE49-F238E27FC236}">
-                <a16:creationId xmlns:a16="http://schemas.microsoft.com/office/drawing/2014/main" id="{A1ACB18C-ED94-433F-82A9-596AD6B6F905}"/>
+                <a16:creationId xmlns:a16="http://schemas.microsoft.com/office/drawing/2014/main" id="{9A05396D-29B9-41A6-9997-E363A9EA5C37}"/>
               </a:ext>
             </a:extLst>
           </p:cNvPr>
@@ -23860,13 +23871,13 @@
         </p:nvSpPr>
         <p:spPr>
           <a:xfrm>
-            <a:off x="838203" y="1825626"/>
-            <a:ext cx="11230157" cy="4803773"/>
+            <a:off x="838200" y="1307466"/>
+            <a:ext cx="10977877" cy="5032373"/>
           </a:xfrm>
         </p:spPr>
         <p:txBody>
           <a:bodyPr>
-            <a:normAutofit/>
+            <a:normAutofit fontScale="92500" lnSpcReduction="10000"/>
           </a:bodyPr>
           <a:lstStyle/>
           <a:p>
@@ -23874,6 +23885,16 @@
               <a:buFont typeface="Courier New" pitchFamily="49"/>
               <a:buChar char="_"/>
             </a:pPr>
+            <a:r>
+              <a:rPr lang="nl-NL">
+                <a:solidFill>
+                  <a:srgbClr val="00FF00"/>
+                </a:solidFill>
+                <a:latin typeface="Courier New" pitchFamily="49"/>
+                <a:cs typeface="Courier New" pitchFamily="49"/>
+              </a:rPr>
+              <a:t>Exercises &gt; Exercises02.cs</a:t>
+            </a:r>
             <a:endParaRPr lang="nl-NL" dirty="0">
               <a:solidFill>
                 <a:srgbClr val="00FF00"/>
@@ -23900,6 +23921,38 @@
               <a:buFont typeface="Courier New" pitchFamily="49"/>
               <a:buChar char="_"/>
             </a:pPr>
+            <a:r>
+              <a:rPr lang="nl-NL">
+                <a:solidFill>
+                  <a:srgbClr val="00FF00"/>
+                </a:solidFill>
+                <a:latin typeface="Courier New" pitchFamily="49"/>
+                <a:cs typeface="Courier New" pitchFamily="49"/>
+              </a:rPr>
+              <a:t>Practice fault simulation and different request matching strategies</a:t>
+            </a:r>
+          </a:p>
+          <a:p>
+            <a:pPr lvl="1">
+              <a:buFont typeface="Courier New" pitchFamily="49"/>
+              <a:buChar char="_"/>
+            </a:pPr>
+            <a:r>
+              <a:rPr lang="nl-NL">
+                <a:solidFill>
+                  <a:srgbClr val="00FF00"/>
+                </a:solidFill>
+                <a:latin typeface="Courier New" pitchFamily="49"/>
+                <a:cs typeface="Courier New" pitchFamily="49"/>
+              </a:rPr>
+              <a:t>Implement the responses as described in the comments</a:t>
+            </a:r>
+          </a:p>
+          <a:p>
+            <a:pPr lvl="0">
+              <a:buFont typeface="Courier New" pitchFamily="49"/>
+              <a:buChar char="_"/>
+            </a:pPr>
             <a:endParaRPr lang="nl-NL" dirty="0">
               <a:solidFill>
                 <a:srgbClr val="00FF00"/>
@@ -23913,6 +23966,144 @@
               <a:buFont typeface="Courier New" pitchFamily="49"/>
               <a:buChar char="_"/>
             </a:pPr>
+            <a:r>
+              <a:rPr lang="nl-NL" dirty="0" err="1">
+                <a:solidFill>
+                  <a:srgbClr val="00FF00"/>
+                </a:solidFill>
+                <a:latin typeface="Courier New" pitchFamily="49"/>
+                <a:cs typeface="Courier New" pitchFamily="49"/>
+              </a:rPr>
+              <a:t>Verify</a:t>
+            </a:r>
+            <a:r>
+              <a:rPr lang="nl-NL" dirty="0">
+                <a:solidFill>
+                  <a:srgbClr val="00FF00"/>
+                </a:solidFill>
+                <a:latin typeface="Courier New" pitchFamily="49"/>
+                <a:cs typeface="Courier New" pitchFamily="49"/>
+              </a:rPr>
+              <a:t> </a:t>
+            </a:r>
+            <a:r>
+              <a:rPr lang="nl-NL" dirty="0" err="1">
+                <a:solidFill>
+                  <a:srgbClr val="00FF00"/>
+                </a:solidFill>
+                <a:latin typeface="Courier New" pitchFamily="49"/>
+                <a:cs typeface="Courier New" pitchFamily="49"/>
+              </a:rPr>
+              <a:t>your</a:t>
+            </a:r>
+            <a:r>
+              <a:rPr lang="nl-NL" dirty="0">
+                <a:solidFill>
+                  <a:srgbClr val="00FF00"/>
+                </a:solidFill>
+                <a:latin typeface="Courier New" pitchFamily="49"/>
+                <a:cs typeface="Courier New" pitchFamily="49"/>
+              </a:rPr>
+              <a:t> solution </a:t>
+            </a:r>
+            <a:r>
+              <a:rPr lang="nl-NL" dirty="0" err="1">
+                <a:solidFill>
+                  <a:srgbClr val="00FF00"/>
+                </a:solidFill>
+                <a:latin typeface="Courier New" pitchFamily="49"/>
+                <a:cs typeface="Courier New" pitchFamily="49"/>
+              </a:rPr>
+              <a:t>by</a:t>
+            </a:r>
+            <a:r>
+              <a:rPr lang="nl-NL" dirty="0">
+                <a:solidFill>
+                  <a:srgbClr val="00FF00"/>
+                </a:solidFill>
+                <a:latin typeface="Courier New" pitchFamily="49"/>
+                <a:cs typeface="Courier New" pitchFamily="49"/>
+              </a:rPr>
+              <a:t> running </a:t>
+            </a:r>
+            <a:r>
+              <a:rPr lang="nl-NL" err="1">
+                <a:solidFill>
+                  <a:srgbClr val="00FF00"/>
+                </a:solidFill>
+                <a:latin typeface="Courier New" pitchFamily="49"/>
+                <a:cs typeface="Courier New" pitchFamily="49"/>
+              </a:rPr>
+              <a:t>the</a:t>
+            </a:r>
+            <a:r>
+              <a:rPr lang="nl-NL">
+                <a:solidFill>
+                  <a:srgbClr val="00FF00"/>
+                </a:solidFill>
+                <a:latin typeface="Courier New" pitchFamily="49"/>
+                <a:cs typeface="Courier New" pitchFamily="49"/>
+              </a:rPr>
+              <a:t> tests in the same class</a:t>
+            </a:r>
+          </a:p>
+          <a:p>
+            <a:pPr lvl="0">
+              <a:buFont typeface="Courier New" pitchFamily="49"/>
+              <a:buChar char="_"/>
+            </a:pPr>
+            <a:endParaRPr lang="nl-NL">
+              <a:solidFill>
+                <a:srgbClr val="00FF00"/>
+              </a:solidFill>
+              <a:latin typeface="Courier New" pitchFamily="49"/>
+              <a:cs typeface="Courier New" pitchFamily="49"/>
+            </a:endParaRPr>
+          </a:p>
+          <a:p>
+            <a:pPr lvl="0">
+              <a:buFont typeface="Courier New" pitchFamily="49"/>
+              <a:buChar char="_"/>
+            </a:pPr>
+            <a:r>
+              <a:rPr lang="nl-NL">
+                <a:solidFill>
+                  <a:srgbClr val="00FF00"/>
+                </a:solidFill>
+                <a:latin typeface="Courier New" pitchFamily="49"/>
+                <a:cs typeface="Courier New" pitchFamily="49"/>
+              </a:rPr>
+              <a:t>Answers are in Answers &gt; Answers02.cs</a:t>
+            </a:r>
+          </a:p>
+          <a:p>
+            <a:pPr lvl="0">
+              <a:buFont typeface="Courier New" pitchFamily="49"/>
+              <a:buChar char="_"/>
+            </a:pPr>
+            <a:endParaRPr lang="nl-NL">
+              <a:solidFill>
+                <a:srgbClr val="00FF00"/>
+              </a:solidFill>
+              <a:latin typeface="Courier New" pitchFamily="49"/>
+              <a:cs typeface="Courier New" pitchFamily="49"/>
+            </a:endParaRPr>
+          </a:p>
+          <a:p>
+            <a:pPr lvl="0">
+              <a:buFont typeface="Courier New" pitchFamily="49"/>
+              <a:buChar char="_"/>
+            </a:pPr>
+            <a:r>
+              <a:rPr lang="nl-NL">
+                <a:solidFill>
+                  <a:srgbClr val="00FF00"/>
+                </a:solidFill>
+                <a:latin typeface="Courier New" pitchFamily="49"/>
+                <a:cs typeface="Courier New" pitchFamily="49"/>
+              </a:rPr>
+              <a:t>Examples are in Examples &gt; Examples02.cs</a:t>
+            </a:r>
             <a:endParaRPr lang="nl-NL" dirty="0">
               <a:solidFill>
                 <a:srgbClr val="00FF00"/>
@@ -23926,42 +24117,6 @@
               <a:buFont typeface="Courier New" pitchFamily="49"/>
               <a:buChar char="_"/>
             </a:pPr>
-            <a:r>
-              <a:rPr lang="nl-NL" dirty="0">
-                <a:solidFill>
-                  <a:srgbClr val="00FF00"/>
-                </a:solidFill>
-                <a:latin typeface="Courier New" pitchFamily="49"/>
-                <a:cs typeface="Courier New" pitchFamily="49"/>
-              </a:rPr>
-              <a:t>HTTP status code 200, but </a:t>
-            </a:r>
-            <a:r>
-              <a:rPr lang="nl-NL" dirty="0" err="1">
-                <a:solidFill>
-                  <a:srgbClr val="00FF00"/>
-                </a:solidFill>
-                <a:latin typeface="Courier New" pitchFamily="49"/>
-                <a:cs typeface="Courier New" pitchFamily="49"/>
-              </a:rPr>
-              <a:t>garbage</a:t>
-            </a:r>
-            <a:r>
-              <a:rPr lang="nl-NL" dirty="0">
-                <a:solidFill>
-                  <a:srgbClr val="00FF00"/>
-                </a:solidFill>
-                <a:latin typeface="Courier New" pitchFamily="49"/>
-                <a:cs typeface="Courier New" pitchFamily="49"/>
-              </a:rPr>
-              <a:t> in response body</a:t>
-            </a:r>
-          </a:p>
-          <a:p>
-            <a:pPr lvl="0">
-              <a:buFont typeface="Courier New" pitchFamily="49"/>
-              <a:buChar char="_"/>
-            </a:pPr>
             <a:endParaRPr lang="nl-NL" dirty="0">
               <a:solidFill>
                 <a:srgbClr val="00FF00"/>
@@ -23975,200 +24130,6 @@
               <a:buFont typeface="Courier New" pitchFamily="49"/>
               <a:buChar char="_"/>
             </a:pPr>
-            <a:r>
-              <a:rPr lang="nl-NL" dirty="0" err="1">
-                <a:solidFill>
-                  <a:srgbClr val="00FF00"/>
-                </a:solidFill>
-                <a:latin typeface="Courier New" pitchFamily="49"/>
-                <a:cs typeface="Courier New" pitchFamily="49"/>
-              </a:rPr>
-              <a:t>Other</a:t>
-            </a:r>
-            <a:r>
-              <a:rPr lang="nl-NL" dirty="0">
-                <a:solidFill>
-                  <a:srgbClr val="00FF00"/>
-                </a:solidFill>
-                <a:latin typeface="Courier New" pitchFamily="49"/>
-                <a:cs typeface="Courier New" pitchFamily="49"/>
-              </a:rPr>
-              <a:t> options:</a:t>
-            </a:r>
-          </a:p>
-          <a:p>
-            <a:pPr lvl="1">
-              <a:buFont typeface="Courier New" pitchFamily="49"/>
-              <a:buChar char="_"/>
-            </a:pPr>
-            <a:r>
-              <a:rPr lang="nl-NL" dirty="0">
-                <a:solidFill>
-                  <a:srgbClr val="00FF00"/>
-                </a:solidFill>
-                <a:latin typeface="Courier New" pitchFamily="49"/>
-                <a:cs typeface="Courier New" pitchFamily="49"/>
-              </a:rPr>
-              <a:t>RANDOM_DATA_THEN_CLOSE (as </a:t>
-            </a:r>
-            <a:r>
-              <a:rPr lang="nl-NL" dirty="0" err="1">
-                <a:solidFill>
-                  <a:srgbClr val="00FF00"/>
-                </a:solidFill>
-                <a:latin typeface="Courier New" pitchFamily="49"/>
-                <a:cs typeface="Courier New" pitchFamily="49"/>
-              </a:rPr>
-              <a:t>above</a:t>
-            </a:r>
-            <a:r>
-              <a:rPr lang="nl-NL" dirty="0">
-                <a:solidFill>
-                  <a:srgbClr val="00FF00"/>
-                </a:solidFill>
-                <a:latin typeface="Courier New" pitchFamily="49"/>
-                <a:cs typeface="Courier New" pitchFamily="49"/>
-              </a:rPr>
-              <a:t>, without HTTP 200)</a:t>
-            </a:r>
-          </a:p>
-          <a:p>
-            <a:pPr lvl="1">
-              <a:buFont typeface="Courier New" pitchFamily="49"/>
-              <a:buChar char="_"/>
-            </a:pPr>
-            <a:r>
-              <a:rPr lang="nl-NL" dirty="0">
-                <a:solidFill>
-                  <a:srgbClr val="00FF00"/>
-                </a:solidFill>
-                <a:latin typeface="Courier New" pitchFamily="49"/>
-                <a:cs typeface="Courier New" pitchFamily="49"/>
-              </a:rPr>
-              <a:t>EMPTY_RESPONSE (does </a:t>
-            </a:r>
-            <a:r>
-              <a:rPr lang="nl-NL" dirty="0" err="1">
-                <a:solidFill>
-                  <a:srgbClr val="00FF00"/>
-                </a:solidFill>
-                <a:latin typeface="Courier New" pitchFamily="49"/>
-                <a:cs typeface="Courier New" pitchFamily="49"/>
-              </a:rPr>
-              <a:t>what</a:t>
-            </a:r>
-            <a:r>
-              <a:rPr lang="nl-NL" dirty="0">
-                <a:solidFill>
-                  <a:srgbClr val="00FF00"/>
-                </a:solidFill>
-                <a:latin typeface="Courier New" pitchFamily="49"/>
-                <a:cs typeface="Courier New" pitchFamily="49"/>
-              </a:rPr>
-              <a:t> </a:t>
-            </a:r>
-            <a:r>
-              <a:rPr lang="nl-NL" dirty="0" err="1">
-                <a:solidFill>
-                  <a:srgbClr val="00FF00"/>
-                </a:solidFill>
-                <a:latin typeface="Courier New" pitchFamily="49"/>
-                <a:cs typeface="Courier New" pitchFamily="49"/>
-              </a:rPr>
-              <a:t>it</a:t>
-            </a:r>
-            <a:r>
-              <a:rPr lang="nl-NL" dirty="0">
-                <a:solidFill>
-                  <a:srgbClr val="00FF00"/>
-                </a:solidFill>
-                <a:latin typeface="Courier New" pitchFamily="49"/>
-                <a:cs typeface="Courier New" pitchFamily="49"/>
-              </a:rPr>
-              <a:t> </a:t>
-            </a:r>
-            <a:r>
-              <a:rPr lang="nl-NL" dirty="0" err="1">
-                <a:solidFill>
-                  <a:srgbClr val="00FF00"/>
-                </a:solidFill>
-                <a:latin typeface="Courier New" pitchFamily="49"/>
-                <a:cs typeface="Courier New" pitchFamily="49"/>
-              </a:rPr>
-              <a:t>says</a:t>
-            </a:r>
-            <a:r>
-              <a:rPr lang="nl-NL" dirty="0">
-                <a:solidFill>
-                  <a:srgbClr val="00FF00"/>
-                </a:solidFill>
-                <a:latin typeface="Courier New" pitchFamily="49"/>
-                <a:cs typeface="Courier New" pitchFamily="49"/>
-              </a:rPr>
-              <a:t> on </a:t>
-            </a:r>
-            <a:r>
-              <a:rPr lang="nl-NL" dirty="0" err="1">
-                <a:solidFill>
-                  <a:srgbClr val="00FF00"/>
-                </a:solidFill>
-                <a:latin typeface="Courier New" pitchFamily="49"/>
-                <a:cs typeface="Courier New" pitchFamily="49"/>
-              </a:rPr>
-              <a:t>the</a:t>
-            </a:r>
-            <a:r>
-              <a:rPr lang="nl-NL" dirty="0">
-                <a:solidFill>
-                  <a:srgbClr val="00FF00"/>
-                </a:solidFill>
-                <a:latin typeface="Courier New" pitchFamily="49"/>
-                <a:cs typeface="Courier New" pitchFamily="49"/>
-              </a:rPr>
-              <a:t> tin)</a:t>
-            </a:r>
-          </a:p>
-          <a:p>
-            <a:pPr lvl="1">
-              <a:buFont typeface="Courier New" pitchFamily="49"/>
-              <a:buChar char="_"/>
-            </a:pPr>
-            <a:r>
-              <a:rPr lang="nl-NL" dirty="0">
-                <a:solidFill>
-                  <a:srgbClr val="00FF00"/>
-                </a:solidFill>
-                <a:latin typeface="Courier New" pitchFamily="49"/>
-                <a:cs typeface="Courier New" pitchFamily="49"/>
-              </a:rPr>
-              <a:t>CONNECTION_RESET_BY_PEER (close </a:t>
-            </a:r>
-            <a:r>
-              <a:rPr lang="nl-NL" dirty="0" err="1">
-                <a:solidFill>
-                  <a:srgbClr val="00FF00"/>
-                </a:solidFill>
-                <a:latin typeface="Courier New" pitchFamily="49"/>
-                <a:cs typeface="Courier New" pitchFamily="49"/>
-              </a:rPr>
-              <a:t>connection</a:t>
-            </a:r>
-            <a:r>
-              <a:rPr lang="nl-NL" dirty="0">
-                <a:solidFill>
-                  <a:srgbClr val="00FF00"/>
-                </a:solidFill>
-                <a:latin typeface="Courier New" pitchFamily="49"/>
-                <a:cs typeface="Courier New" pitchFamily="49"/>
-              </a:rPr>
-              <a:t>, no response)</a:t>
-            </a:r>
-          </a:p>
-          <a:p>
-            <a:pPr lvl="0">
-              <a:buFont typeface="Courier New" pitchFamily="49"/>
-              <a:buChar char="_"/>
-            </a:pPr>
             <a:endParaRPr lang="nl-NL" dirty="0">
               <a:solidFill>
                 <a:srgbClr val="00FF00"/>
@@ -24216,415 +24177,131 @@
               <a:cs typeface="Courier New" pitchFamily="49"/>
             </a:endParaRPr>
           </a:p>
-          <a:p>
-            <a:pPr lvl="0">
-              <a:buFont typeface="Courier New" pitchFamily="49"/>
-              <a:buChar char="_"/>
-            </a:pPr>
-            <a:endParaRPr lang="nl-NL" dirty="0">
-              <a:solidFill>
-                <a:srgbClr val="00FF00"/>
-              </a:solidFill>
-              <a:latin typeface="Courier New" pitchFamily="49"/>
-              <a:cs typeface="Courier New" pitchFamily="49"/>
-            </a:endParaRPr>
-          </a:p>
-        </p:txBody>
-      </p:sp>
-      <p:pic>
-        <p:nvPicPr>
-          <p:cNvPr id="4" name="Picture 3">
-            <a:extLst>
-              <a:ext uri="{FF2B5EF4-FFF2-40B4-BE49-F238E27FC236}">
-                <a16:creationId xmlns:a16="http://schemas.microsoft.com/office/drawing/2014/main" id="{0F68B765-58CF-4968-A088-6924ED20AEE7}"/>
-              </a:ext>
-            </a:extLst>
-          </p:cNvPr>
-          <p:cNvPicPr>
-            <a:picLocks noChangeAspect="1"/>
-          </p:cNvPicPr>
-          <p:nvPr/>
-        </p:nvPicPr>
-        <p:blipFill>
-          <a:blip r:embed="rId2"/>
-          <a:stretch>
-            <a:fillRect/>
-          </a:stretch>
-        </p:blipFill>
-        <p:spPr>
-          <a:xfrm>
-            <a:off x="838203" y="1825627"/>
-            <a:ext cx="7962430" cy="1987247"/>
-          </a:xfrm>
-          <a:prstGeom prst="rect">
-            <a:avLst/>
-          </a:prstGeom>
-          <a:noFill/>
-          <a:ln cap="flat">
-            <a:noFill/>
-          </a:ln>
-        </p:spPr>
-      </p:pic>
-      <p:sp>
-        <p:nvSpPr>
-          <p:cNvPr id="5" name="Oval 4">
-            <a:extLst>
-              <a:ext uri="{FF2B5EF4-FFF2-40B4-BE49-F238E27FC236}">
-                <a16:creationId xmlns:a16="http://schemas.microsoft.com/office/drawing/2014/main" id="{8D491272-9A84-4337-A595-BC6C2FD42FFF}"/>
-              </a:ext>
-            </a:extLst>
-          </p:cNvPr>
-          <p:cNvSpPr/>
-          <p:nvPr/>
-        </p:nvSpPr>
-        <p:spPr>
-          <a:xfrm flipV="1">
-            <a:off x="2445488" y="2860158"/>
-            <a:ext cx="6402377" cy="457166"/>
-          </a:xfrm>
-          <a:prstGeom prst="ellipse">
-            <a:avLst/>
-          </a:prstGeom>
-          <a:noFill/>
-          <a:ln w="38100">
-            <a:solidFill>
-              <a:srgbClr val="00FF00"/>
-            </a:solidFill>
-          </a:ln>
-        </p:spPr>
-        <p:style>
-          <a:lnRef idx="2">
-            <a:schemeClr val="accent1">
-              <a:shade val="50000"/>
-            </a:schemeClr>
-          </a:lnRef>
-          <a:fillRef idx="1">
-            <a:schemeClr val="accent1"/>
-          </a:fillRef>
-          <a:effectRef idx="0">
-            <a:schemeClr val="accent1"/>
-          </a:effectRef>
-          <a:fontRef idx="minor">
-            <a:schemeClr val="lt1"/>
-          </a:fontRef>
-        </p:style>
-        <p:txBody>
-          <a:bodyPr rtlCol="0" anchor="ctr"/>
-          <a:lstStyle/>
-          <a:p>
-            <a:pPr marL="0" marR="0" lvl="0" indent="0" algn="ctr" defTabSz="914400" rtl="0" eaLnBrk="1" fontAlgn="auto" latinLnBrk="0" hangingPunct="1">
-              <a:lnSpc>
-                <a:spcPct val="100000"/>
-              </a:lnSpc>
-              <a:spcBef>
-                <a:spcPts val="0"/>
-              </a:spcBef>
-              <a:spcAft>
-                <a:spcPts val="0"/>
-              </a:spcAft>
-              <a:buClrTx/>
-              <a:buSzTx/>
-              <a:buFontTx/>
-              <a:buNone/>
-              <a:tabLst/>
-              <a:defRPr/>
-            </a:pPr>
-            <a:endParaRPr kumimoji="0" lang="nl-NL" sz="1800" b="0" i="0" u="none" strike="noStrike" kern="1200" cap="none" spc="0" normalizeH="0" baseline="0" noProof="0">
-              <a:ln>
-                <a:noFill/>
-              </a:ln>
-              <a:solidFill>
-                <a:prstClr val="white"/>
-              </a:solidFill>
-              <a:effectLst/>
-              <a:uLnTx/>
-              <a:uFillTx/>
-              <a:latin typeface="Calibri" panose="020F0502020204030204"/>
-              <a:ea typeface="+mn-ea"/>
-              <a:cs typeface="+mn-cs"/>
-            </a:endParaRPr>
-          </a:p>
         </p:txBody>
       </p:sp>
     </p:spTree>
+    <p:extLst>
+      <p:ext uri="{BB962C8B-B14F-4D97-AF65-F5344CB8AC3E}">
+        <p14:creationId xmlns:p14="http://schemas.microsoft.com/office/powerpoint/2010/main" val="3893329588"/>
+      </p:ext>
+    </p:extLst>
   </p:cSld>
   <p:clrMapOvr>
     <a:masterClrMapping/>
   </p:clrMapOvr>
-  <p:timing>
-    <p:tnLst>
-      <p:par>
-        <p:cTn id="1" dur="indefinite" restart="never" nodeType="tmRoot">
-          <p:childTnLst>
-            <p:seq concurrent="1" nextAc="seek">
-              <p:cTn id="2" dur="indefinite" nodeType="mainSeq">
-                <p:childTnLst>
-                  <p:par>
-                    <p:cTn id="3" fill="hold">
-                      <p:stCondLst>
-                        <p:cond delay="indefinite"/>
-                      </p:stCondLst>
-                      <p:childTnLst>
-                        <p:par>
-                          <p:cTn id="4" fill="hold">
-                            <p:stCondLst>
-                              <p:cond delay="0"/>
-                            </p:stCondLst>
-                            <p:childTnLst>
-                              <p:par>
-                                <p:cTn id="5" presetID="1" presetClass="entr" presetSubtype="0" fill="hold" grpId="0" nodeType="clickEffect">
-                                  <p:stCondLst>
-                                    <p:cond delay="0"/>
-                                  </p:stCondLst>
-                                  <p:childTnLst>
-                                    <p:set>
-                                      <p:cBhvr>
-                                        <p:cTn id="6" dur="1" fill="hold">
-                                          <p:stCondLst>
-                                            <p:cond delay="0"/>
-                                          </p:stCondLst>
-                                        </p:cTn>
-                                        <p:tgtEl>
-                                          <p:spTgt spid="5"/>
-                                        </p:tgtEl>
-                                        <p:attrNameLst>
-                                          <p:attrName>style.visibility</p:attrName>
-                                        </p:attrNameLst>
-                                      </p:cBhvr>
-                                      <p:to>
-                                        <p:strVal val="visible"/>
-                                      </p:to>
-                                    </p:set>
-                                  </p:childTnLst>
-                                </p:cTn>
-                              </p:par>
-                            </p:childTnLst>
-                          </p:cTn>
-                        </p:par>
-                      </p:childTnLst>
-                    </p:cTn>
-                  </p:par>
-                  <p:par>
-                    <p:cTn id="7" fill="hold">
-                      <p:stCondLst>
-                        <p:cond delay="indefinite"/>
-                      </p:stCondLst>
-                      <p:childTnLst>
-                        <p:par>
-                          <p:cTn id="8" fill="hold">
-                            <p:stCondLst>
-                              <p:cond delay="0"/>
-                            </p:stCondLst>
-                            <p:childTnLst>
-                              <p:par>
-                                <p:cTn id="9" presetID="1" presetClass="entr" presetSubtype="0" fill="hold" grpId="0" nodeType="clickEffect">
-                                  <p:stCondLst>
-                                    <p:cond delay="0"/>
-                                  </p:stCondLst>
-                                  <p:childTnLst>
-                                    <p:set>
-                                      <p:cBhvr>
-                                        <p:cTn id="10" dur="1" fill="hold">
-                                          <p:stCondLst>
-                                            <p:cond delay="0"/>
-                                          </p:stCondLst>
-                                        </p:cTn>
-                                        <p:tgtEl>
-                                          <p:spTgt spid="3">
-                                            <p:txEl>
-                                              <p:pRg st="4" end="4"/>
-                                            </p:txEl>
-                                          </p:spTgt>
-                                        </p:tgtEl>
-                                        <p:attrNameLst>
-                                          <p:attrName>style.visibility</p:attrName>
-                                        </p:attrNameLst>
-                                      </p:cBhvr>
-                                      <p:to>
-                                        <p:strVal val="visible"/>
-                                      </p:to>
-                                    </p:set>
-                                  </p:childTnLst>
-                                </p:cTn>
-                              </p:par>
-                            </p:childTnLst>
-                          </p:cTn>
-                        </p:par>
-                      </p:childTnLst>
-                    </p:cTn>
-                  </p:par>
-                  <p:par>
-                    <p:cTn id="11" fill="hold">
-                      <p:stCondLst>
-                        <p:cond delay="indefinite"/>
-                      </p:stCondLst>
-                      <p:childTnLst>
-                        <p:par>
-                          <p:cTn id="12" fill="hold">
-                            <p:stCondLst>
-                              <p:cond delay="0"/>
-                            </p:stCondLst>
-                            <p:childTnLst>
-                              <p:par>
-                                <p:cTn id="13" presetID="1" presetClass="entr" presetSubtype="0" fill="hold" grpId="0" nodeType="clickEffect">
-                                  <p:stCondLst>
-                                    <p:cond delay="0"/>
-                                  </p:stCondLst>
-                                  <p:childTnLst>
-                                    <p:set>
-                                      <p:cBhvr>
-                                        <p:cTn id="14" dur="1" fill="hold">
-                                          <p:stCondLst>
-                                            <p:cond delay="0"/>
-                                          </p:stCondLst>
-                                        </p:cTn>
-                                        <p:tgtEl>
-                                          <p:spTgt spid="3">
-                                            <p:txEl>
-                                              <p:pRg st="6" end="6"/>
-                                            </p:txEl>
-                                          </p:spTgt>
-                                        </p:tgtEl>
-                                        <p:attrNameLst>
-                                          <p:attrName>style.visibility</p:attrName>
-                                        </p:attrNameLst>
-                                      </p:cBhvr>
-                                      <p:to>
-                                        <p:strVal val="visible"/>
-                                      </p:to>
-                                    </p:set>
-                                  </p:childTnLst>
-                                </p:cTn>
-                              </p:par>
-                              <p:par>
-                                <p:cTn id="15" presetID="1" presetClass="entr" presetSubtype="0" fill="hold" grpId="0" nodeType="withEffect">
-                                  <p:stCondLst>
-                                    <p:cond delay="0"/>
-                                  </p:stCondLst>
-                                  <p:childTnLst>
-                                    <p:set>
-                                      <p:cBhvr>
-                                        <p:cTn id="16" dur="1" fill="hold">
-                                          <p:stCondLst>
-                                            <p:cond delay="0"/>
-                                          </p:stCondLst>
-                                        </p:cTn>
-                                        <p:tgtEl>
-                                          <p:spTgt spid="3">
-                                            <p:txEl>
-                                              <p:pRg st="7" end="7"/>
-                                            </p:txEl>
-                                          </p:spTgt>
-                                        </p:tgtEl>
-                                        <p:attrNameLst>
-                                          <p:attrName>style.visibility</p:attrName>
-                                        </p:attrNameLst>
-                                      </p:cBhvr>
-                                      <p:to>
-                                        <p:strVal val="visible"/>
-                                      </p:to>
-                                    </p:set>
-                                  </p:childTnLst>
-                                </p:cTn>
-                              </p:par>
-                              <p:par>
-                                <p:cTn id="17" presetID="1" presetClass="entr" presetSubtype="0" fill="hold" grpId="0" nodeType="withEffect">
-                                  <p:stCondLst>
-                                    <p:cond delay="0"/>
-                                  </p:stCondLst>
-                                  <p:childTnLst>
-                                    <p:set>
-                                      <p:cBhvr>
-                                        <p:cTn id="18" dur="1" fill="hold">
-                                          <p:stCondLst>
-                                            <p:cond delay="0"/>
-                                          </p:stCondLst>
-                                        </p:cTn>
-                                        <p:tgtEl>
-                                          <p:spTgt spid="3">
-                                            <p:txEl>
-                                              <p:pRg st="8" end="8"/>
-                                            </p:txEl>
-                                          </p:spTgt>
-                                        </p:tgtEl>
-                                        <p:attrNameLst>
-                                          <p:attrName>style.visibility</p:attrName>
-                                        </p:attrNameLst>
-                                      </p:cBhvr>
-                                      <p:to>
-                                        <p:strVal val="visible"/>
-                                      </p:to>
-                                    </p:set>
-                                  </p:childTnLst>
-                                </p:cTn>
-                              </p:par>
-                              <p:par>
-                                <p:cTn id="19" presetID="1" presetClass="entr" presetSubtype="0" fill="hold" grpId="0" nodeType="withEffect">
-                                  <p:stCondLst>
-                                    <p:cond delay="0"/>
-                                  </p:stCondLst>
-                                  <p:childTnLst>
-                                    <p:set>
-                                      <p:cBhvr>
-                                        <p:cTn id="20" dur="1" fill="hold">
-                                          <p:stCondLst>
-                                            <p:cond delay="0"/>
-                                          </p:stCondLst>
-                                        </p:cTn>
-                                        <p:tgtEl>
-                                          <p:spTgt spid="3">
-                                            <p:txEl>
-                                              <p:pRg st="9" end="9"/>
-                                            </p:txEl>
-                                          </p:spTgt>
-                                        </p:tgtEl>
-                                        <p:attrNameLst>
-                                          <p:attrName>style.visibility</p:attrName>
-                                        </p:attrNameLst>
-                                      </p:cBhvr>
-                                      <p:to>
-                                        <p:strVal val="visible"/>
-                                      </p:to>
-                                    </p:set>
-                                  </p:childTnLst>
-                                </p:cTn>
-                              </p:par>
-                            </p:childTnLst>
-                          </p:cTn>
-                        </p:par>
-                      </p:childTnLst>
-                    </p:cTn>
-                  </p:par>
-                </p:childTnLst>
-              </p:cTn>
-              <p:prevCondLst>
-                <p:cond evt="onPrev" delay="0">
-                  <p:tgtEl>
-                    <p:sldTgt/>
-                  </p:tgtEl>
-                </p:cond>
-              </p:prevCondLst>
-              <p:nextCondLst>
-                <p:cond evt="onNext" delay="0">
-                  <p:tgtEl>
-                    <p:sldTgt/>
-                  </p:tgtEl>
-                </p:cond>
-              </p:nextCondLst>
-            </p:seq>
-          </p:childTnLst>
-        </p:cTn>
-      </p:par>
-    </p:tnLst>
-    <p:bldLst>
-      <p:bldP spid="3" grpId="0" uiExpand="1" build="p"/>
-      <p:bldP spid="5" grpId="0" animBg="1"/>
-    </p:bldLst>
-  </p:timing>
 </p:sld>
 </file>
 
 <file path=ppt/slides/slide35.xml><?xml version="1.0" encoding="utf-8"?>
+<p:sld xmlns:a="http://schemas.openxmlformats.org/drawingml/2006/main" xmlns:r="http://schemas.openxmlformats.org/officeDocument/2006/relationships" xmlns:p="http://schemas.openxmlformats.org/presentationml/2006/main">
+  <p:cSld>
+    <p:bg>
+      <p:bgPr>
+        <a:solidFill>
+          <a:schemeClr val="tx1"/>
+        </a:solidFill>
+        <a:effectLst/>
+      </p:bgPr>
+    </p:bg>
+    <p:spTree>
+      <p:nvGrpSpPr>
+        <p:cNvPr id="1" name=""/>
+        <p:cNvGrpSpPr/>
+        <p:nvPr/>
+      </p:nvGrpSpPr>
+      <p:grpSpPr>
+        <a:xfrm>
+          <a:off x="0" y="0"/>
+          <a:ext cx="0" cy="0"/>
+          <a:chOff x="0" y="0"/>
+          <a:chExt cx="0" cy="0"/>
+        </a:xfrm>
+      </p:grpSpPr>
+      <p:sp>
+        <p:nvSpPr>
+          <p:cNvPr id="2" name="Title 1"/>
+          <p:cNvSpPr>
+            <a:spLocks noGrp="1"/>
+          </p:cNvSpPr>
+          <p:nvPr>
+            <p:ph type="title"/>
+          </p:nvPr>
+        </p:nvSpPr>
+        <p:spPr>
+          <a:xfrm>
+            <a:off x="2" y="2267636"/>
+            <a:ext cx="12191998" cy="2369662"/>
+          </a:xfrm>
+        </p:spPr>
+        <p:txBody>
+          <a:bodyPr>
+            <a:noAutofit/>
+          </a:bodyPr>
+          <a:lstStyle/>
+          <a:p>
+            <a:pPr algn="ctr"/>
+            <a:r>
+              <a:rPr lang="nl-NL" sz="6500">
+                <a:solidFill>
+                  <a:srgbClr val="00FF00"/>
+                </a:solidFill>
+                <a:latin typeface="Courier New" panose="02070309020205020404" pitchFamily="49" charset="0"/>
+                <a:cs typeface="Courier New" panose="02070309020205020404" pitchFamily="49" charset="0"/>
+              </a:rPr>
+              <a:t>Section 3:</a:t>
+            </a:r>
+            <a:br>
+              <a:rPr lang="nl-NL" sz="6500">
+                <a:solidFill>
+                  <a:srgbClr val="00FF00"/>
+                </a:solidFill>
+                <a:latin typeface="Courier New" panose="02070309020205020404" pitchFamily="49" charset="0"/>
+                <a:cs typeface="Courier New" panose="02070309020205020404" pitchFamily="49" charset="0"/>
+              </a:rPr>
+            </a:br>
+            <a:br>
+              <a:rPr lang="nl-NL" sz="6500">
+                <a:solidFill>
+                  <a:srgbClr val="00FF00"/>
+                </a:solidFill>
+                <a:latin typeface="Courier New" panose="02070309020205020404" pitchFamily="49" charset="0"/>
+                <a:cs typeface="Courier New" panose="02070309020205020404" pitchFamily="49" charset="0"/>
+              </a:rPr>
+            </a:br>
+            <a:r>
+              <a:rPr lang="nl-NL" sz="6500">
+                <a:solidFill>
+                  <a:srgbClr val="00FF00"/>
+                </a:solidFill>
+                <a:latin typeface="Courier New" panose="02070309020205020404" pitchFamily="49" charset="0"/>
+                <a:cs typeface="Courier New" panose="02070309020205020404" pitchFamily="49" charset="0"/>
+              </a:rPr>
+              <a:t>Creating stateful mocks</a:t>
+            </a:r>
+            <a:endParaRPr lang="nl-NL" sz="6500" dirty="0">
+              <a:solidFill>
+                <a:srgbClr val="00FF00"/>
+              </a:solidFill>
+              <a:latin typeface="Courier New" panose="02070309020205020404" pitchFamily="49" charset="0"/>
+              <a:cs typeface="Courier New" panose="02070309020205020404" pitchFamily="49" charset="0"/>
+            </a:endParaRPr>
+          </a:p>
+        </p:txBody>
+      </p:sp>
+    </p:spTree>
+    <p:extLst>
+      <p:ext uri="{BB962C8B-B14F-4D97-AF65-F5344CB8AC3E}">
+        <p14:creationId xmlns:p14="http://schemas.microsoft.com/office/powerpoint/2010/main" val="1286348827"/>
+      </p:ext>
+    </p:extLst>
+  </p:cSld>
+  <p:clrMapOvr>
+    <a:masterClrMapping/>
+  </p:clrMapOvr>
+</p:sld>
+</file>
+
+<file path=ppt/slides/slide36.xml><?xml version="1.0" encoding="utf-8"?>
 <p:sld xmlns:a="http://schemas.openxmlformats.org/drawingml/2006/main" xmlns:r="http://schemas.openxmlformats.org/officeDocument/2006/relationships" xmlns:p="http://schemas.openxmlformats.org/presentationml/2006/main">
   <p:cSld>
     <p:bg>
@@ -24654,7 +24331,7 @@
           <p:cNvPr id="2" name="Title 1">
             <a:extLst>
               <a:ext uri="{FF2B5EF4-FFF2-40B4-BE49-F238E27FC236}">
-                <a16:creationId xmlns:a16="http://schemas.microsoft.com/office/drawing/2014/main" id="{C0B4D458-4D33-4286-AFEF-1B613A4DDEAA}"/>
+                <a16:creationId xmlns:a16="http://schemas.microsoft.com/office/drawing/2014/main" id="{285D9D1D-CF0E-444D-BF61-6E6E92619F56}"/>
               </a:ext>
             </a:extLst>
           </p:cNvPr>
@@ -24665,12 +24342,7 @@
             <p:ph type="title"/>
           </p:nvPr>
         </p:nvSpPr>
-        <p:spPr>
-          <a:xfrm>
-            <a:off x="838200" y="111129"/>
-            <a:ext cx="10515600" cy="721991"/>
-          </a:xfrm>
-        </p:spPr>
+        <p:spPr/>
         <p:txBody>
           <a:bodyPr/>
           <a:lstStyle/>
@@ -24684,15 +24356,8 @@
                 <a:latin typeface="Courier New" pitchFamily="49"/>
                 <a:cs typeface="Courier New" pitchFamily="49"/>
               </a:rPr>
-              <a:t>Now it’s your turn!</a:t>
-            </a:r>
-            <a:endParaRPr lang="nl-NL" dirty="0">
-              <a:solidFill>
-                <a:srgbClr val="00FF00"/>
-              </a:solidFill>
-              <a:latin typeface="Courier New" pitchFamily="49"/>
-              <a:cs typeface="Courier New" pitchFamily="49"/>
-            </a:endParaRPr>
+              <a:t>Statefulness</a:t>
+            </a:r>
           </a:p>
         </p:txBody>
       </p:sp>
@@ -24701,7 +24366,7 @@
           <p:cNvPr id="3" name="Content Placeholder 2">
             <a:extLst>
               <a:ext uri="{FF2B5EF4-FFF2-40B4-BE49-F238E27FC236}">
-                <a16:creationId xmlns:a16="http://schemas.microsoft.com/office/drawing/2014/main" id="{9A05396D-29B9-41A6-9997-E363A9EA5C37}"/>
+                <a16:creationId xmlns:a16="http://schemas.microsoft.com/office/drawing/2014/main" id="{8287466E-59AE-4FAE-B4E2-27D0E0D7A69F}"/>
               </a:ext>
             </a:extLst>
           </p:cNvPr>
@@ -24712,15 +24377,10 @@
             <p:ph idx="1"/>
           </p:nvPr>
         </p:nvSpPr>
-        <p:spPr>
-          <a:xfrm>
-            <a:off x="838200" y="1307466"/>
-            <a:ext cx="10977877" cy="5032373"/>
-          </a:xfrm>
-        </p:spPr>
+        <p:spPr/>
         <p:txBody>
           <a:bodyPr>
-            <a:normAutofit fontScale="92500" lnSpcReduction="10000"/>
+            <a:normAutofit/>
           </a:bodyPr>
           <a:lstStyle/>
           <a:p>
@@ -24736,7 +24396,7 @@
                 <a:latin typeface="Courier New" pitchFamily="49"/>
                 <a:cs typeface="Courier New" pitchFamily="49"/>
               </a:rPr>
-              <a:t>Exercises &gt; Exercises02.cs</a:t>
+              <a:t>Sometimes, you want to simulate stateful behaviour</a:t>
             </a:r>
             <a:endParaRPr lang="nl-NL" dirty="0">
               <a:solidFill>
@@ -24772,23 +24432,7 @@
                 <a:latin typeface="Courier New" pitchFamily="49"/>
                 <a:cs typeface="Courier New" pitchFamily="49"/>
               </a:rPr>
-              <a:t>Practice fault simulation and different request matching strategies</a:t>
-            </a:r>
-          </a:p>
-          <a:p>
-            <a:pPr lvl="1">
-              <a:buFont typeface="Courier New" pitchFamily="49"/>
-              <a:buChar char="_"/>
-            </a:pPr>
-            <a:r>
-              <a:rPr lang="nl-NL">
-                <a:solidFill>
-                  <a:srgbClr val="00FF00"/>
-                </a:solidFill>
-                <a:latin typeface="Courier New" pitchFamily="49"/>
-                <a:cs typeface="Courier New" pitchFamily="49"/>
-              </a:rPr>
-              <a:t>Implement the responses as described in the comments</a:t>
+              <a:t>Shopping cart (empty / containing items)</a:t>
             </a:r>
           </a:p>
           <a:p>
@@ -24796,6 +24440,29 @@
               <a:buFont typeface="Courier New" pitchFamily="49"/>
               <a:buChar char="_"/>
             </a:pPr>
+            <a:endParaRPr lang="nl-NL">
+              <a:solidFill>
+                <a:srgbClr val="00FF00"/>
+              </a:solidFill>
+              <a:latin typeface="Courier New" pitchFamily="49"/>
+              <a:cs typeface="Courier New" pitchFamily="49"/>
+            </a:endParaRPr>
+          </a:p>
+          <a:p>
+            <a:pPr lvl="0">
+              <a:buFont typeface="Courier New" pitchFamily="49"/>
+              <a:buChar char="_"/>
+            </a:pPr>
+            <a:r>
+              <a:rPr lang="nl-NL">
+                <a:solidFill>
+                  <a:srgbClr val="00FF00"/>
+                </a:solidFill>
+                <a:latin typeface="Courier New" pitchFamily="49"/>
+                <a:cs typeface="Courier New" pitchFamily="49"/>
+              </a:rPr>
+              <a:t>Database (data present / not present)</a:t>
+            </a:r>
             <a:endParaRPr lang="nl-NL" dirty="0">
               <a:solidFill>
                 <a:srgbClr val="00FF00"/>
@@ -24809,144 +24476,6 @@
               <a:buFont typeface="Courier New" pitchFamily="49"/>
               <a:buChar char="_"/>
             </a:pPr>
-            <a:r>
-              <a:rPr lang="nl-NL" dirty="0" err="1">
-                <a:solidFill>
-                  <a:srgbClr val="00FF00"/>
-                </a:solidFill>
-                <a:latin typeface="Courier New" pitchFamily="49"/>
-                <a:cs typeface="Courier New" pitchFamily="49"/>
-              </a:rPr>
-              <a:t>Verify</a:t>
-            </a:r>
-            <a:r>
-              <a:rPr lang="nl-NL" dirty="0">
-                <a:solidFill>
-                  <a:srgbClr val="00FF00"/>
-                </a:solidFill>
-                <a:latin typeface="Courier New" pitchFamily="49"/>
-                <a:cs typeface="Courier New" pitchFamily="49"/>
-              </a:rPr>
-              <a:t> </a:t>
-            </a:r>
-            <a:r>
-              <a:rPr lang="nl-NL" dirty="0" err="1">
-                <a:solidFill>
-                  <a:srgbClr val="00FF00"/>
-                </a:solidFill>
-                <a:latin typeface="Courier New" pitchFamily="49"/>
-                <a:cs typeface="Courier New" pitchFamily="49"/>
-              </a:rPr>
-              <a:t>your</a:t>
-            </a:r>
-            <a:r>
-              <a:rPr lang="nl-NL" dirty="0">
-                <a:solidFill>
-                  <a:srgbClr val="00FF00"/>
-                </a:solidFill>
-                <a:latin typeface="Courier New" pitchFamily="49"/>
-                <a:cs typeface="Courier New" pitchFamily="49"/>
-              </a:rPr>
-              <a:t> solution </a:t>
-            </a:r>
-            <a:r>
-              <a:rPr lang="nl-NL" dirty="0" err="1">
-                <a:solidFill>
-                  <a:srgbClr val="00FF00"/>
-                </a:solidFill>
-                <a:latin typeface="Courier New" pitchFamily="49"/>
-                <a:cs typeface="Courier New" pitchFamily="49"/>
-              </a:rPr>
-              <a:t>by</a:t>
-            </a:r>
-            <a:r>
-              <a:rPr lang="nl-NL" dirty="0">
-                <a:solidFill>
-                  <a:srgbClr val="00FF00"/>
-                </a:solidFill>
-                <a:latin typeface="Courier New" pitchFamily="49"/>
-                <a:cs typeface="Courier New" pitchFamily="49"/>
-              </a:rPr>
-              <a:t> running </a:t>
-            </a:r>
-            <a:r>
-              <a:rPr lang="nl-NL" err="1">
-                <a:solidFill>
-                  <a:srgbClr val="00FF00"/>
-                </a:solidFill>
-                <a:latin typeface="Courier New" pitchFamily="49"/>
-                <a:cs typeface="Courier New" pitchFamily="49"/>
-              </a:rPr>
-              <a:t>the</a:t>
-            </a:r>
-            <a:r>
-              <a:rPr lang="nl-NL">
-                <a:solidFill>
-                  <a:srgbClr val="00FF00"/>
-                </a:solidFill>
-                <a:latin typeface="Courier New" pitchFamily="49"/>
-                <a:cs typeface="Courier New" pitchFamily="49"/>
-              </a:rPr>
-              <a:t> tests in the same class</a:t>
-            </a:r>
-          </a:p>
-          <a:p>
-            <a:pPr lvl="0">
-              <a:buFont typeface="Courier New" pitchFamily="49"/>
-              <a:buChar char="_"/>
-            </a:pPr>
-            <a:endParaRPr lang="nl-NL">
-              <a:solidFill>
-                <a:srgbClr val="00FF00"/>
-              </a:solidFill>
-              <a:latin typeface="Courier New" pitchFamily="49"/>
-              <a:cs typeface="Courier New" pitchFamily="49"/>
-            </a:endParaRPr>
-          </a:p>
-          <a:p>
-            <a:pPr lvl="0">
-              <a:buFont typeface="Courier New" pitchFamily="49"/>
-              <a:buChar char="_"/>
-            </a:pPr>
-            <a:r>
-              <a:rPr lang="nl-NL">
-                <a:solidFill>
-                  <a:srgbClr val="00FF00"/>
-                </a:solidFill>
-                <a:latin typeface="Courier New" pitchFamily="49"/>
-                <a:cs typeface="Courier New" pitchFamily="49"/>
-              </a:rPr>
-              <a:t>Answers are in Answers &gt; Answers02.cs</a:t>
-            </a:r>
-          </a:p>
-          <a:p>
-            <a:pPr lvl="0">
-              <a:buFont typeface="Courier New" pitchFamily="49"/>
-              <a:buChar char="_"/>
-            </a:pPr>
-            <a:endParaRPr lang="nl-NL">
-              <a:solidFill>
-                <a:srgbClr val="00FF00"/>
-              </a:solidFill>
-              <a:latin typeface="Courier New" pitchFamily="49"/>
-              <a:cs typeface="Courier New" pitchFamily="49"/>
-            </a:endParaRPr>
-          </a:p>
-          <a:p>
-            <a:pPr lvl="0">
-              <a:buFont typeface="Courier New" pitchFamily="49"/>
-              <a:buChar char="_"/>
-            </a:pPr>
-            <a:r>
-              <a:rPr lang="nl-NL">
-                <a:solidFill>
-                  <a:srgbClr val="00FF00"/>
-                </a:solidFill>
-                <a:latin typeface="Courier New" pitchFamily="49"/>
-                <a:cs typeface="Courier New" pitchFamily="49"/>
-              </a:rPr>
-              <a:t>Examples are in Examples &gt; Examples02.cs</a:t>
-            </a:r>
             <a:endParaRPr lang="nl-NL" dirty="0">
               <a:solidFill>
                 <a:srgbClr val="00FF00"/>
@@ -24960,6 +24489,16 @@
               <a:buFont typeface="Courier New" pitchFamily="49"/>
               <a:buChar char="_"/>
             </a:pPr>
+            <a:r>
+              <a:rPr lang="nl-NL">
+                <a:solidFill>
+                  <a:srgbClr val="00FF00"/>
+                </a:solidFill>
+                <a:latin typeface="Courier New" pitchFamily="49"/>
+                <a:cs typeface="Courier New" pitchFamily="49"/>
+              </a:rPr>
+              <a:t>Order in which requests arrive is significant</a:t>
+            </a:r>
             <a:endParaRPr lang="nl-NL" dirty="0">
               <a:solidFill>
                 <a:srgbClr val="00FF00"/>
@@ -25020,123 +24559,22 @@
               <a:cs typeface="Courier New" pitchFamily="49"/>
             </a:endParaRPr>
           </a:p>
-        </p:txBody>
-      </p:sp>
-    </p:spTree>
-    <p:extLst>
-      <p:ext uri="{BB962C8B-B14F-4D97-AF65-F5344CB8AC3E}">
-        <p14:creationId xmlns:p14="http://schemas.microsoft.com/office/powerpoint/2010/main" val="3893329588"/>
-      </p:ext>
-    </p:extLst>
-  </p:cSld>
-  <p:clrMapOvr>
-    <a:masterClrMapping/>
-  </p:clrMapOvr>
-</p:sld>
-</file>
-
-<file path=ppt/slides/slide36.xml><?xml version="1.0" encoding="utf-8"?>
-<p:sld xmlns:a="http://schemas.openxmlformats.org/drawingml/2006/main" xmlns:r="http://schemas.openxmlformats.org/officeDocument/2006/relationships" xmlns:p="http://schemas.openxmlformats.org/presentationml/2006/main">
-  <p:cSld>
-    <p:bg>
-      <p:bgPr>
-        <a:solidFill>
-          <a:schemeClr val="tx1"/>
-        </a:solidFill>
-        <a:effectLst/>
-      </p:bgPr>
-    </p:bg>
-    <p:spTree>
-      <p:nvGrpSpPr>
-        <p:cNvPr id="1" name=""/>
-        <p:cNvGrpSpPr/>
-        <p:nvPr/>
-      </p:nvGrpSpPr>
-      <p:grpSpPr>
-        <a:xfrm>
-          <a:off x="0" y="0"/>
-          <a:ext cx="0" cy="0"/>
-          <a:chOff x="0" y="0"/>
-          <a:chExt cx="0" cy="0"/>
-        </a:xfrm>
-      </p:grpSpPr>
-      <p:sp>
-        <p:nvSpPr>
-          <p:cNvPr id="2" name="Title 1"/>
-          <p:cNvSpPr>
-            <a:spLocks noGrp="1"/>
-          </p:cNvSpPr>
-          <p:nvPr>
-            <p:ph type="title"/>
-          </p:nvPr>
-        </p:nvSpPr>
-        <p:spPr>
-          <a:xfrm>
-            <a:off x="2" y="2267636"/>
-            <a:ext cx="12191998" cy="2369662"/>
-          </a:xfrm>
-        </p:spPr>
-        <p:txBody>
-          <a:bodyPr>
-            <a:noAutofit/>
-          </a:bodyPr>
-          <a:lstStyle/>
-          <a:p>
-            <a:pPr algn="ctr"/>
-            <a:r>
-              <a:rPr lang="nl-NL" sz="6500">
-                <a:solidFill>
-                  <a:srgbClr val="00FF00"/>
-                </a:solidFill>
-                <a:latin typeface="Courier New" panose="02070309020205020404" pitchFamily="49" charset="0"/>
-                <a:cs typeface="Courier New" panose="02070309020205020404" pitchFamily="49" charset="0"/>
-              </a:rPr>
-              <a:t>Section 3:</a:t>
-            </a:r>
-            <a:br>
-              <a:rPr lang="nl-NL" sz="6500">
-                <a:solidFill>
-                  <a:srgbClr val="00FF00"/>
-                </a:solidFill>
-                <a:latin typeface="Courier New" panose="02070309020205020404" pitchFamily="49" charset="0"/>
-                <a:cs typeface="Courier New" panose="02070309020205020404" pitchFamily="49" charset="0"/>
-              </a:rPr>
-            </a:br>
-            <a:br>
-              <a:rPr lang="nl-NL" sz="6500">
-                <a:solidFill>
-                  <a:srgbClr val="00FF00"/>
-                </a:solidFill>
-                <a:latin typeface="Courier New" panose="02070309020205020404" pitchFamily="49" charset="0"/>
-                <a:cs typeface="Courier New" panose="02070309020205020404" pitchFamily="49" charset="0"/>
-              </a:rPr>
-            </a:br>
-            <a:r>
-              <a:rPr lang="nl-NL" sz="6500">
-                <a:solidFill>
-                  <a:srgbClr val="00FF00"/>
-                </a:solidFill>
-                <a:latin typeface="Courier New" panose="02070309020205020404" pitchFamily="49" charset="0"/>
-                <a:cs typeface="Courier New" panose="02070309020205020404" pitchFamily="49" charset="0"/>
-              </a:rPr>
-              <a:t>Creating stateful mocks</a:t>
-            </a:r>
-            <a:endParaRPr lang="nl-NL" sz="6500" dirty="0">
+          <a:p>
+            <a:pPr lvl="0">
+              <a:buFont typeface="Courier New" pitchFamily="49"/>
+              <a:buChar char="_"/>
+            </a:pPr>
+            <a:endParaRPr lang="nl-NL" dirty="0">
               <a:solidFill>
                 <a:srgbClr val="00FF00"/>
               </a:solidFill>
-              <a:latin typeface="Courier New" panose="02070309020205020404" pitchFamily="49" charset="0"/>
-              <a:cs typeface="Courier New" panose="02070309020205020404" pitchFamily="49" charset="0"/>
+              <a:latin typeface="Courier New" pitchFamily="49"/>
+              <a:cs typeface="Courier New" pitchFamily="49"/>
             </a:endParaRPr>
           </a:p>
         </p:txBody>
       </p:sp>
     </p:spTree>
-    <p:extLst>
-      <p:ext uri="{BB962C8B-B14F-4D97-AF65-F5344CB8AC3E}">
-        <p14:creationId xmlns:p14="http://schemas.microsoft.com/office/powerpoint/2010/main" val="1286348827"/>
-      </p:ext>
-    </p:extLst>
   </p:cSld>
   <p:clrMapOvr>
     <a:masterClrMapping/>
@@ -25199,7 +24637,7 @@
                 <a:latin typeface="Courier New" pitchFamily="49"/>
                 <a:cs typeface="Courier New" pitchFamily="49"/>
               </a:rPr>
-              <a:t>Statefulness</a:t>
+              <a:t>Stateful mocks in WireMock.Net</a:t>
             </a:r>
           </a:p>
         </p:txBody>
@@ -25222,287 +24660,6 @@
         </p:nvSpPr>
         <p:spPr/>
         <p:txBody>
-          <a:bodyPr>
-            <a:normAutofit/>
-          </a:bodyPr>
-          <a:lstStyle/>
-          <a:p>
-            <a:pPr lvl="0">
-              <a:buFont typeface="Courier New" pitchFamily="49"/>
-              <a:buChar char="_"/>
-            </a:pPr>
-            <a:r>
-              <a:rPr lang="nl-NL">
-                <a:solidFill>
-                  <a:srgbClr val="00FF00"/>
-                </a:solidFill>
-                <a:latin typeface="Courier New" pitchFamily="49"/>
-                <a:cs typeface="Courier New" pitchFamily="49"/>
-              </a:rPr>
-              <a:t>Sometimes, you want to simulate stateful behaviour</a:t>
-            </a:r>
-            <a:endParaRPr lang="nl-NL" dirty="0">
-              <a:solidFill>
-                <a:srgbClr val="00FF00"/>
-              </a:solidFill>
-              <a:latin typeface="Courier New" pitchFamily="49"/>
-              <a:cs typeface="Courier New" pitchFamily="49"/>
-            </a:endParaRPr>
-          </a:p>
-          <a:p>
-            <a:pPr lvl="0">
-              <a:buFont typeface="Courier New" pitchFamily="49"/>
-              <a:buChar char="_"/>
-            </a:pPr>
-            <a:endParaRPr lang="nl-NL" dirty="0">
-              <a:solidFill>
-                <a:srgbClr val="00FF00"/>
-              </a:solidFill>
-              <a:latin typeface="Courier New" pitchFamily="49"/>
-              <a:cs typeface="Courier New" pitchFamily="49"/>
-            </a:endParaRPr>
-          </a:p>
-          <a:p>
-            <a:pPr lvl="0">
-              <a:buFont typeface="Courier New" pitchFamily="49"/>
-              <a:buChar char="_"/>
-            </a:pPr>
-            <a:r>
-              <a:rPr lang="nl-NL">
-                <a:solidFill>
-                  <a:srgbClr val="00FF00"/>
-                </a:solidFill>
-                <a:latin typeface="Courier New" pitchFamily="49"/>
-                <a:cs typeface="Courier New" pitchFamily="49"/>
-              </a:rPr>
-              <a:t>Shopping cart (empty / containing items)</a:t>
-            </a:r>
-          </a:p>
-          <a:p>
-            <a:pPr lvl="0">
-              <a:buFont typeface="Courier New" pitchFamily="49"/>
-              <a:buChar char="_"/>
-            </a:pPr>
-            <a:endParaRPr lang="nl-NL">
-              <a:solidFill>
-                <a:srgbClr val="00FF00"/>
-              </a:solidFill>
-              <a:latin typeface="Courier New" pitchFamily="49"/>
-              <a:cs typeface="Courier New" pitchFamily="49"/>
-            </a:endParaRPr>
-          </a:p>
-          <a:p>
-            <a:pPr lvl="0">
-              <a:buFont typeface="Courier New" pitchFamily="49"/>
-              <a:buChar char="_"/>
-            </a:pPr>
-            <a:r>
-              <a:rPr lang="nl-NL">
-                <a:solidFill>
-                  <a:srgbClr val="00FF00"/>
-                </a:solidFill>
-                <a:latin typeface="Courier New" pitchFamily="49"/>
-                <a:cs typeface="Courier New" pitchFamily="49"/>
-              </a:rPr>
-              <a:t>Database (data present / not present)</a:t>
-            </a:r>
-            <a:endParaRPr lang="nl-NL" dirty="0">
-              <a:solidFill>
-                <a:srgbClr val="00FF00"/>
-              </a:solidFill>
-              <a:latin typeface="Courier New" pitchFamily="49"/>
-              <a:cs typeface="Courier New" pitchFamily="49"/>
-            </a:endParaRPr>
-          </a:p>
-          <a:p>
-            <a:pPr lvl="0">
-              <a:buFont typeface="Courier New" pitchFamily="49"/>
-              <a:buChar char="_"/>
-            </a:pPr>
-            <a:endParaRPr lang="nl-NL" dirty="0">
-              <a:solidFill>
-                <a:srgbClr val="00FF00"/>
-              </a:solidFill>
-              <a:latin typeface="Courier New" pitchFamily="49"/>
-              <a:cs typeface="Courier New" pitchFamily="49"/>
-            </a:endParaRPr>
-          </a:p>
-          <a:p>
-            <a:pPr lvl="0">
-              <a:buFont typeface="Courier New" pitchFamily="49"/>
-              <a:buChar char="_"/>
-            </a:pPr>
-            <a:r>
-              <a:rPr lang="nl-NL">
-                <a:solidFill>
-                  <a:srgbClr val="00FF00"/>
-                </a:solidFill>
-                <a:latin typeface="Courier New" pitchFamily="49"/>
-                <a:cs typeface="Courier New" pitchFamily="49"/>
-              </a:rPr>
-              <a:t>Order in which requests arrive is significant</a:t>
-            </a:r>
-            <a:endParaRPr lang="nl-NL" dirty="0">
-              <a:solidFill>
-                <a:srgbClr val="00FF00"/>
-              </a:solidFill>
-              <a:latin typeface="Courier New" pitchFamily="49"/>
-              <a:cs typeface="Courier New" pitchFamily="49"/>
-            </a:endParaRPr>
-          </a:p>
-          <a:p>
-            <a:pPr lvl="0">
-              <a:buFont typeface="Courier New" pitchFamily="49"/>
-              <a:buChar char="_"/>
-            </a:pPr>
-            <a:endParaRPr lang="nl-NL" dirty="0">
-              <a:solidFill>
-                <a:srgbClr val="00FF00"/>
-              </a:solidFill>
-              <a:latin typeface="Courier New" pitchFamily="49"/>
-              <a:cs typeface="Courier New" pitchFamily="49"/>
-            </a:endParaRPr>
-          </a:p>
-          <a:p>
-            <a:pPr lvl="0">
-              <a:buFont typeface="Courier New" pitchFamily="49"/>
-              <a:buChar char="_"/>
-            </a:pPr>
-            <a:endParaRPr lang="nl-NL" dirty="0">
-              <a:solidFill>
-                <a:srgbClr val="00FF00"/>
-              </a:solidFill>
-              <a:latin typeface="Courier New" pitchFamily="49"/>
-              <a:cs typeface="Courier New" pitchFamily="49"/>
-            </a:endParaRPr>
-          </a:p>
-          <a:p>
-            <a:pPr lvl="0">
-              <a:buFont typeface="Courier New" pitchFamily="49"/>
-              <a:buChar char="_"/>
-            </a:pPr>
-            <a:endParaRPr lang="nl-NL" dirty="0">
-              <a:solidFill>
-                <a:srgbClr val="00FF00"/>
-              </a:solidFill>
-              <a:latin typeface="Courier New" pitchFamily="49"/>
-              <a:cs typeface="Courier New" pitchFamily="49"/>
-            </a:endParaRPr>
-          </a:p>
-          <a:p>
-            <a:pPr lvl="0">
-              <a:buFont typeface="Courier New" pitchFamily="49"/>
-              <a:buChar char="_"/>
-            </a:pPr>
-            <a:endParaRPr lang="nl-NL" dirty="0">
-              <a:solidFill>
-                <a:srgbClr val="00FF00"/>
-              </a:solidFill>
-              <a:latin typeface="Courier New" pitchFamily="49"/>
-              <a:cs typeface="Courier New" pitchFamily="49"/>
-            </a:endParaRPr>
-          </a:p>
-          <a:p>
-            <a:pPr lvl="0">
-              <a:buFont typeface="Courier New" pitchFamily="49"/>
-              <a:buChar char="_"/>
-            </a:pPr>
-            <a:endParaRPr lang="nl-NL" dirty="0">
-              <a:solidFill>
-                <a:srgbClr val="00FF00"/>
-              </a:solidFill>
-              <a:latin typeface="Courier New" pitchFamily="49"/>
-              <a:cs typeface="Courier New" pitchFamily="49"/>
-            </a:endParaRPr>
-          </a:p>
-        </p:txBody>
-      </p:sp>
-    </p:spTree>
-  </p:cSld>
-  <p:clrMapOvr>
-    <a:masterClrMapping/>
-  </p:clrMapOvr>
-</p:sld>
-</file>
-
-<file path=ppt/slides/slide38.xml><?xml version="1.0" encoding="utf-8"?>
-<p:sld xmlns:a="http://schemas.openxmlformats.org/drawingml/2006/main" xmlns:r="http://schemas.openxmlformats.org/officeDocument/2006/relationships" xmlns:p="http://schemas.openxmlformats.org/presentationml/2006/main">
-  <p:cSld>
-    <p:bg>
-      <p:bgPr>
-        <a:solidFill>
-          <a:srgbClr val="000000"/>
-        </a:solidFill>
-        <a:effectLst/>
-      </p:bgPr>
-    </p:bg>
-    <p:spTree>
-      <p:nvGrpSpPr>
-        <p:cNvPr id="1" name=""/>
-        <p:cNvGrpSpPr/>
-        <p:nvPr/>
-      </p:nvGrpSpPr>
-      <p:grpSpPr>
-        <a:xfrm>
-          <a:off x="0" y="0"/>
-          <a:ext cx="0" cy="0"/>
-          <a:chOff x="0" y="0"/>
-          <a:chExt cx="0" cy="0"/>
-        </a:xfrm>
-      </p:grpSpPr>
-      <p:sp>
-        <p:nvSpPr>
-          <p:cNvPr id="2" name="Title 1">
-            <a:extLst>
-              <a:ext uri="{FF2B5EF4-FFF2-40B4-BE49-F238E27FC236}">
-                <a16:creationId xmlns:a16="http://schemas.microsoft.com/office/drawing/2014/main" id="{285D9D1D-CF0E-444D-BF61-6E6E92619F56}"/>
-              </a:ext>
-            </a:extLst>
-          </p:cNvPr>
-          <p:cNvSpPr txBox="1">
-            <a:spLocks noGrp="1"/>
-          </p:cNvSpPr>
-          <p:nvPr>
-            <p:ph type="title"/>
-          </p:nvPr>
-        </p:nvSpPr>
-        <p:spPr/>
-        <p:txBody>
-          <a:bodyPr/>
-          <a:lstStyle/>
-          <a:p>
-            <a:pPr lvl="0"/>
-            <a:r>
-              <a:rPr lang="nl-NL">
-                <a:solidFill>
-                  <a:srgbClr val="00FF00"/>
-                </a:solidFill>
-                <a:latin typeface="Courier New" pitchFamily="49"/>
-                <a:cs typeface="Courier New" pitchFamily="49"/>
-              </a:rPr>
-              <a:t>Stateful mocks in WireMock.Net</a:t>
-            </a:r>
-          </a:p>
-        </p:txBody>
-      </p:sp>
-      <p:sp>
-        <p:nvSpPr>
-          <p:cNvPr id="3" name="Content Placeholder 2">
-            <a:extLst>
-              <a:ext uri="{FF2B5EF4-FFF2-40B4-BE49-F238E27FC236}">
-                <a16:creationId xmlns:a16="http://schemas.microsoft.com/office/drawing/2014/main" id="{8287466E-59AE-4FAE-B4E2-27D0E0D7A69F}"/>
-              </a:ext>
-            </a:extLst>
-          </p:cNvPr>
-          <p:cNvSpPr txBox="1">
-            <a:spLocks noGrp="1"/>
-          </p:cNvSpPr>
-          <p:nvPr>
-            <p:ph idx="1"/>
-          </p:nvPr>
-        </p:nvSpPr>
-        <p:spPr/>
-        <p:txBody>
           <a:bodyPr/>
           <a:lstStyle/>
           <a:p>
@@ -26098,7 +25255,7 @@
 </p:sld>
 </file>
 
-<file path=ppt/slides/slide39.xml><?xml version="1.0" encoding="utf-8"?>
+<file path=ppt/slides/slide38.xml><?xml version="1.0" encoding="utf-8"?>
 <p:sld xmlns:a="http://schemas.openxmlformats.org/drawingml/2006/main" xmlns:r="http://schemas.openxmlformats.org/officeDocument/2006/relationships" xmlns:p="http://schemas.openxmlformats.org/presentationml/2006/main">
   <p:cSld>
     <p:bg>
@@ -26306,8 +25463,8 @@
         </p:nvSpPr>
         <p:spPr>
           <a:xfrm>
-            <a:off x="919475" y="2110537"/>
-            <a:ext cx="2352043" cy="184704"/>
+            <a:off x="868675" y="2080056"/>
+            <a:ext cx="2352043" cy="287223"/>
           </a:xfrm>
           <a:prstGeom prst="ellipse">
             <a:avLst/>
@@ -26516,8 +25673,8 @@
         </p:nvSpPr>
         <p:spPr>
           <a:xfrm>
-            <a:off x="919477" y="3819393"/>
-            <a:ext cx="2352043" cy="184704"/>
+            <a:off x="868675" y="3790939"/>
+            <a:ext cx="2352043" cy="287222"/>
           </a:xfrm>
           <a:prstGeom prst="ellipse">
             <a:avLst/>
@@ -26568,8 +25725,8 @@
         </p:nvSpPr>
         <p:spPr>
           <a:xfrm>
-            <a:off x="919476" y="5730240"/>
-            <a:ext cx="2352043" cy="184704"/>
+            <a:off x="868675" y="5679440"/>
+            <a:ext cx="2352043" cy="287222"/>
           </a:xfrm>
           <a:prstGeom prst="ellipse">
             <a:avLst/>
@@ -26868,6 +26025,417 @@
 </p:sld>
 </file>
 
+<file path=ppt/slides/slide39.xml><?xml version="1.0" encoding="utf-8"?>
+<p:sld xmlns:a="http://schemas.openxmlformats.org/drawingml/2006/main" xmlns:r="http://schemas.openxmlformats.org/officeDocument/2006/relationships" xmlns:p="http://schemas.openxmlformats.org/presentationml/2006/main">
+  <p:cSld>
+    <p:bg>
+      <p:bgPr>
+        <a:solidFill>
+          <a:srgbClr val="000000"/>
+        </a:solidFill>
+        <a:effectLst/>
+      </p:bgPr>
+    </p:bg>
+    <p:spTree>
+      <p:nvGrpSpPr>
+        <p:cNvPr id="1" name=""/>
+        <p:cNvGrpSpPr/>
+        <p:nvPr/>
+      </p:nvGrpSpPr>
+      <p:grpSpPr>
+        <a:xfrm>
+          <a:off x="0" y="0"/>
+          <a:ext cx="0" cy="0"/>
+          <a:chOff x="0" y="0"/>
+          <a:chExt cx="0" cy="0"/>
+        </a:xfrm>
+      </p:grpSpPr>
+      <p:sp>
+        <p:nvSpPr>
+          <p:cNvPr id="2" name="Title 1">
+            <a:extLst>
+              <a:ext uri="{FF2B5EF4-FFF2-40B4-BE49-F238E27FC236}">
+                <a16:creationId xmlns:a16="http://schemas.microsoft.com/office/drawing/2014/main" id="{C0B4D458-4D33-4286-AFEF-1B613A4DDEAA}"/>
+              </a:ext>
+            </a:extLst>
+          </p:cNvPr>
+          <p:cNvSpPr txBox="1">
+            <a:spLocks noGrp="1"/>
+          </p:cNvSpPr>
+          <p:nvPr>
+            <p:ph type="title"/>
+          </p:nvPr>
+        </p:nvSpPr>
+        <p:spPr>
+          <a:xfrm>
+            <a:off x="838200" y="111129"/>
+            <a:ext cx="10515600" cy="721991"/>
+          </a:xfrm>
+        </p:spPr>
+        <p:txBody>
+          <a:bodyPr/>
+          <a:lstStyle/>
+          <a:p>
+            <a:pPr lvl="0"/>
+            <a:r>
+              <a:rPr lang="nl-NL">
+                <a:solidFill>
+                  <a:srgbClr val="00FF00"/>
+                </a:solidFill>
+                <a:latin typeface="Courier New" pitchFamily="49"/>
+                <a:cs typeface="Courier New" pitchFamily="49"/>
+              </a:rPr>
+              <a:t>Now it’s your turn!</a:t>
+            </a:r>
+            <a:endParaRPr lang="nl-NL" dirty="0">
+              <a:solidFill>
+                <a:srgbClr val="00FF00"/>
+              </a:solidFill>
+              <a:latin typeface="Courier New" pitchFamily="49"/>
+              <a:cs typeface="Courier New" pitchFamily="49"/>
+            </a:endParaRPr>
+          </a:p>
+        </p:txBody>
+      </p:sp>
+      <p:sp>
+        <p:nvSpPr>
+          <p:cNvPr id="3" name="Content Placeholder 2">
+            <a:extLst>
+              <a:ext uri="{FF2B5EF4-FFF2-40B4-BE49-F238E27FC236}">
+                <a16:creationId xmlns:a16="http://schemas.microsoft.com/office/drawing/2014/main" id="{9A05396D-29B9-41A6-9997-E363A9EA5C37}"/>
+              </a:ext>
+            </a:extLst>
+          </p:cNvPr>
+          <p:cNvSpPr txBox="1">
+            <a:spLocks noGrp="1"/>
+          </p:cNvSpPr>
+          <p:nvPr>
+            <p:ph idx="1"/>
+          </p:nvPr>
+        </p:nvSpPr>
+        <p:spPr>
+          <a:xfrm>
+            <a:off x="838200" y="1307466"/>
+            <a:ext cx="10977877" cy="5032373"/>
+          </a:xfrm>
+        </p:spPr>
+        <p:txBody>
+          <a:bodyPr>
+            <a:normAutofit fontScale="92500" lnSpcReduction="10000"/>
+          </a:bodyPr>
+          <a:lstStyle/>
+          <a:p>
+            <a:pPr lvl="0">
+              <a:buFont typeface="Courier New" pitchFamily="49"/>
+              <a:buChar char="_"/>
+            </a:pPr>
+            <a:r>
+              <a:rPr lang="nl-NL">
+                <a:solidFill>
+                  <a:srgbClr val="00FF00"/>
+                </a:solidFill>
+                <a:latin typeface="Courier New" pitchFamily="49"/>
+                <a:cs typeface="Courier New" pitchFamily="49"/>
+              </a:rPr>
+              <a:t>Exercises &gt; Exercises03.cs</a:t>
+            </a:r>
+            <a:endParaRPr lang="nl-NL" dirty="0">
+              <a:solidFill>
+                <a:srgbClr val="00FF00"/>
+              </a:solidFill>
+              <a:latin typeface="Courier New" pitchFamily="49"/>
+              <a:cs typeface="Courier New" pitchFamily="49"/>
+            </a:endParaRPr>
+          </a:p>
+          <a:p>
+            <a:pPr lvl="0">
+              <a:buFont typeface="Courier New" pitchFamily="49"/>
+              <a:buChar char="_"/>
+            </a:pPr>
+            <a:endParaRPr lang="nl-NL" dirty="0">
+              <a:solidFill>
+                <a:srgbClr val="00FF00"/>
+              </a:solidFill>
+              <a:latin typeface="Courier New" pitchFamily="49"/>
+              <a:cs typeface="Courier New" pitchFamily="49"/>
+            </a:endParaRPr>
+          </a:p>
+          <a:p>
+            <a:pPr lvl="0">
+              <a:buFont typeface="Courier New" pitchFamily="49"/>
+              <a:buChar char="_"/>
+            </a:pPr>
+            <a:r>
+              <a:rPr lang="nl-NL">
+                <a:solidFill>
+                  <a:srgbClr val="00FF00"/>
+                </a:solidFill>
+                <a:latin typeface="Courier New" pitchFamily="49"/>
+                <a:cs typeface="Courier New" pitchFamily="49"/>
+              </a:rPr>
+              <a:t>Create a stateful mock that exerts the described behaviour</a:t>
+            </a:r>
+          </a:p>
+          <a:p>
+            <a:pPr lvl="1">
+              <a:buFont typeface="Courier New" pitchFamily="49"/>
+              <a:buChar char="_"/>
+            </a:pPr>
+            <a:r>
+              <a:rPr lang="nl-NL">
+                <a:solidFill>
+                  <a:srgbClr val="00FF00"/>
+                </a:solidFill>
+                <a:latin typeface="Courier New" pitchFamily="49"/>
+                <a:cs typeface="Courier New" pitchFamily="49"/>
+              </a:rPr>
+              <a:t>Implement the responses as described in the comments</a:t>
+            </a:r>
+          </a:p>
+          <a:p>
+            <a:pPr lvl="0">
+              <a:buFont typeface="Courier New" pitchFamily="49"/>
+              <a:buChar char="_"/>
+            </a:pPr>
+            <a:endParaRPr lang="nl-NL" dirty="0">
+              <a:solidFill>
+                <a:srgbClr val="00FF00"/>
+              </a:solidFill>
+              <a:latin typeface="Courier New" pitchFamily="49"/>
+              <a:cs typeface="Courier New" pitchFamily="49"/>
+            </a:endParaRPr>
+          </a:p>
+          <a:p>
+            <a:pPr lvl="0">
+              <a:buFont typeface="Courier New" pitchFamily="49"/>
+              <a:buChar char="_"/>
+            </a:pPr>
+            <a:r>
+              <a:rPr lang="nl-NL" dirty="0" err="1">
+                <a:solidFill>
+                  <a:srgbClr val="00FF00"/>
+                </a:solidFill>
+                <a:latin typeface="Courier New" pitchFamily="49"/>
+                <a:cs typeface="Courier New" pitchFamily="49"/>
+              </a:rPr>
+              <a:t>Verify</a:t>
+            </a:r>
+            <a:r>
+              <a:rPr lang="nl-NL" dirty="0">
+                <a:solidFill>
+                  <a:srgbClr val="00FF00"/>
+                </a:solidFill>
+                <a:latin typeface="Courier New" pitchFamily="49"/>
+                <a:cs typeface="Courier New" pitchFamily="49"/>
+              </a:rPr>
+              <a:t> </a:t>
+            </a:r>
+            <a:r>
+              <a:rPr lang="nl-NL" dirty="0" err="1">
+                <a:solidFill>
+                  <a:srgbClr val="00FF00"/>
+                </a:solidFill>
+                <a:latin typeface="Courier New" pitchFamily="49"/>
+                <a:cs typeface="Courier New" pitchFamily="49"/>
+              </a:rPr>
+              <a:t>your</a:t>
+            </a:r>
+            <a:r>
+              <a:rPr lang="nl-NL" dirty="0">
+                <a:solidFill>
+                  <a:srgbClr val="00FF00"/>
+                </a:solidFill>
+                <a:latin typeface="Courier New" pitchFamily="49"/>
+                <a:cs typeface="Courier New" pitchFamily="49"/>
+              </a:rPr>
+              <a:t> solution </a:t>
+            </a:r>
+            <a:r>
+              <a:rPr lang="nl-NL" dirty="0" err="1">
+                <a:solidFill>
+                  <a:srgbClr val="00FF00"/>
+                </a:solidFill>
+                <a:latin typeface="Courier New" pitchFamily="49"/>
+                <a:cs typeface="Courier New" pitchFamily="49"/>
+              </a:rPr>
+              <a:t>by</a:t>
+            </a:r>
+            <a:r>
+              <a:rPr lang="nl-NL" dirty="0">
+                <a:solidFill>
+                  <a:srgbClr val="00FF00"/>
+                </a:solidFill>
+                <a:latin typeface="Courier New" pitchFamily="49"/>
+                <a:cs typeface="Courier New" pitchFamily="49"/>
+              </a:rPr>
+              <a:t> running </a:t>
+            </a:r>
+            <a:r>
+              <a:rPr lang="nl-NL" err="1">
+                <a:solidFill>
+                  <a:srgbClr val="00FF00"/>
+                </a:solidFill>
+                <a:latin typeface="Courier New" pitchFamily="49"/>
+                <a:cs typeface="Courier New" pitchFamily="49"/>
+              </a:rPr>
+              <a:t>the</a:t>
+            </a:r>
+            <a:r>
+              <a:rPr lang="nl-NL">
+                <a:solidFill>
+                  <a:srgbClr val="00FF00"/>
+                </a:solidFill>
+                <a:latin typeface="Courier New" pitchFamily="49"/>
+                <a:cs typeface="Courier New" pitchFamily="49"/>
+              </a:rPr>
+              <a:t> tests in the same class</a:t>
+            </a:r>
+          </a:p>
+          <a:p>
+            <a:pPr lvl="0">
+              <a:buFont typeface="Courier New" pitchFamily="49"/>
+              <a:buChar char="_"/>
+            </a:pPr>
+            <a:endParaRPr lang="nl-NL">
+              <a:solidFill>
+                <a:srgbClr val="00FF00"/>
+              </a:solidFill>
+              <a:latin typeface="Courier New" pitchFamily="49"/>
+              <a:cs typeface="Courier New" pitchFamily="49"/>
+            </a:endParaRPr>
+          </a:p>
+          <a:p>
+            <a:pPr lvl="0">
+              <a:buFont typeface="Courier New" pitchFamily="49"/>
+              <a:buChar char="_"/>
+            </a:pPr>
+            <a:r>
+              <a:rPr lang="nl-NL">
+                <a:solidFill>
+                  <a:srgbClr val="00FF00"/>
+                </a:solidFill>
+                <a:latin typeface="Courier New" pitchFamily="49"/>
+                <a:cs typeface="Courier New" pitchFamily="49"/>
+              </a:rPr>
+              <a:t>Answers are in Answers &gt; Answers03.cs</a:t>
+            </a:r>
+          </a:p>
+          <a:p>
+            <a:pPr lvl="0">
+              <a:buFont typeface="Courier New" pitchFamily="49"/>
+              <a:buChar char="_"/>
+            </a:pPr>
+            <a:endParaRPr lang="nl-NL">
+              <a:solidFill>
+                <a:srgbClr val="00FF00"/>
+              </a:solidFill>
+              <a:latin typeface="Courier New" pitchFamily="49"/>
+              <a:cs typeface="Courier New" pitchFamily="49"/>
+            </a:endParaRPr>
+          </a:p>
+          <a:p>
+            <a:pPr lvl="0">
+              <a:buFont typeface="Courier New" pitchFamily="49"/>
+              <a:buChar char="_"/>
+            </a:pPr>
+            <a:r>
+              <a:rPr lang="nl-NL">
+                <a:solidFill>
+                  <a:srgbClr val="00FF00"/>
+                </a:solidFill>
+                <a:latin typeface="Courier New" pitchFamily="49"/>
+                <a:cs typeface="Courier New" pitchFamily="49"/>
+              </a:rPr>
+              <a:t>Examples are in Examples &gt; Examples03.cs</a:t>
+            </a:r>
+            <a:endParaRPr lang="nl-NL" dirty="0">
+              <a:solidFill>
+                <a:srgbClr val="00FF00"/>
+              </a:solidFill>
+              <a:latin typeface="Courier New" pitchFamily="49"/>
+              <a:cs typeface="Courier New" pitchFamily="49"/>
+            </a:endParaRPr>
+          </a:p>
+          <a:p>
+            <a:pPr lvl="0">
+              <a:buFont typeface="Courier New" pitchFamily="49"/>
+              <a:buChar char="_"/>
+            </a:pPr>
+            <a:endParaRPr lang="nl-NL" dirty="0">
+              <a:solidFill>
+                <a:srgbClr val="00FF00"/>
+              </a:solidFill>
+              <a:latin typeface="Courier New" pitchFamily="49"/>
+              <a:cs typeface="Courier New" pitchFamily="49"/>
+            </a:endParaRPr>
+          </a:p>
+          <a:p>
+            <a:pPr lvl="0">
+              <a:buFont typeface="Courier New" pitchFamily="49"/>
+              <a:buChar char="_"/>
+            </a:pPr>
+            <a:endParaRPr lang="nl-NL" dirty="0">
+              <a:solidFill>
+                <a:srgbClr val="00FF00"/>
+              </a:solidFill>
+              <a:latin typeface="Courier New" pitchFamily="49"/>
+              <a:cs typeface="Courier New" pitchFamily="49"/>
+            </a:endParaRPr>
+          </a:p>
+          <a:p>
+            <a:pPr lvl="0">
+              <a:buFont typeface="Courier New" pitchFamily="49"/>
+              <a:buChar char="_"/>
+            </a:pPr>
+            <a:endParaRPr lang="nl-NL" dirty="0">
+              <a:solidFill>
+                <a:srgbClr val="00FF00"/>
+              </a:solidFill>
+              <a:latin typeface="Courier New" pitchFamily="49"/>
+              <a:cs typeface="Courier New" pitchFamily="49"/>
+            </a:endParaRPr>
+          </a:p>
+          <a:p>
+            <a:pPr lvl="0">
+              <a:buFont typeface="Courier New" pitchFamily="49"/>
+              <a:buChar char="_"/>
+            </a:pPr>
+            <a:endParaRPr lang="nl-NL" dirty="0">
+              <a:solidFill>
+                <a:srgbClr val="00FF00"/>
+              </a:solidFill>
+              <a:latin typeface="Courier New" pitchFamily="49"/>
+              <a:cs typeface="Courier New" pitchFamily="49"/>
+            </a:endParaRPr>
+          </a:p>
+          <a:p>
+            <a:pPr lvl="0">
+              <a:buFont typeface="Courier New" pitchFamily="49"/>
+              <a:buChar char="_"/>
+            </a:pPr>
+            <a:endParaRPr lang="nl-NL" dirty="0">
+              <a:solidFill>
+                <a:srgbClr val="00FF00"/>
+              </a:solidFill>
+              <a:latin typeface="Courier New" pitchFamily="49"/>
+              <a:cs typeface="Courier New" pitchFamily="49"/>
+            </a:endParaRPr>
+          </a:p>
+        </p:txBody>
+      </p:sp>
+    </p:spTree>
+    <p:extLst>
+      <p:ext uri="{BB962C8B-B14F-4D97-AF65-F5344CB8AC3E}">
+        <p14:creationId xmlns:p14="http://schemas.microsoft.com/office/powerpoint/2010/main" val="737803410"/>
+      </p:ext>
+    </p:extLst>
+  </p:cSld>
+  <p:clrMapOvr>
+    <a:masterClrMapping/>
+  </p:clrMapOvr>
+</p:sld>
+</file>
+
 <file path=ppt/slides/slide4.xml><?xml version="1.0" encoding="utf-8"?>
 <p:sld xmlns:a="http://schemas.openxmlformats.org/drawingml/2006/main" xmlns:r="http://schemas.openxmlformats.org/officeDocument/2006/relationships" xmlns:p="http://schemas.openxmlformats.org/presentationml/2006/main">
   <p:cSld>
@@ -26983,417 +26551,6 @@
     <p:bg>
       <p:bgPr>
         <a:solidFill>
-          <a:srgbClr val="000000"/>
-        </a:solidFill>
-        <a:effectLst/>
-      </p:bgPr>
-    </p:bg>
-    <p:spTree>
-      <p:nvGrpSpPr>
-        <p:cNvPr id="1" name=""/>
-        <p:cNvGrpSpPr/>
-        <p:nvPr/>
-      </p:nvGrpSpPr>
-      <p:grpSpPr>
-        <a:xfrm>
-          <a:off x="0" y="0"/>
-          <a:ext cx="0" cy="0"/>
-          <a:chOff x="0" y="0"/>
-          <a:chExt cx="0" cy="0"/>
-        </a:xfrm>
-      </p:grpSpPr>
-      <p:sp>
-        <p:nvSpPr>
-          <p:cNvPr id="2" name="Title 1">
-            <a:extLst>
-              <a:ext uri="{FF2B5EF4-FFF2-40B4-BE49-F238E27FC236}">
-                <a16:creationId xmlns:a16="http://schemas.microsoft.com/office/drawing/2014/main" id="{C0B4D458-4D33-4286-AFEF-1B613A4DDEAA}"/>
-              </a:ext>
-            </a:extLst>
-          </p:cNvPr>
-          <p:cNvSpPr txBox="1">
-            <a:spLocks noGrp="1"/>
-          </p:cNvSpPr>
-          <p:nvPr>
-            <p:ph type="title"/>
-          </p:nvPr>
-        </p:nvSpPr>
-        <p:spPr>
-          <a:xfrm>
-            <a:off x="838200" y="111129"/>
-            <a:ext cx="10515600" cy="721991"/>
-          </a:xfrm>
-        </p:spPr>
-        <p:txBody>
-          <a:bodyPr/>
-          <a:lstStyle/>
-          <a:p>
-            <a:pPr lvl="0"/>
-            <a:r>
-              <a:rPr lang="nl-NL">
-                <a:solidFill>
-                  <a:srgbClr val="00FF00"/>
-                </a:solidFill>
-                <a:latin typeface="Courier New" pitchFamily="49"/>
-                <a:cs typeface="Courier New" pitchFamily="49"/>
-              </a:rPr>
-              <a:t>Now it’s your turn!</a:t>
-            </a:r>
-            <a:endParaRPr lang="nl-NL" dirty="0">
-              <a:solidFill>
-                <a:srgbClr val="00FF00"/>
-              </a:solidFill>
-              <a:latin typeface="Courier New" pitchFamily="49"/>
-              <a:cs typeface="Courier New" pitchFamily="49"/>
-            </a:endParaRPr>
-          </a:p>
-        </p:txBody>
-      </p:sp>
-      <p:sp>
-        <p:nvSpPr>
-          <p:cNvPr id="3" name="Content Placeholder 2">
-            <a:extLst>
-              <a:ext uri="{FF2B5EF4-FFF2-40B4-BE49-F238E27FC236}">
-                <a16:creationId xmlns:a16="http://schemas.microsoft.com/office/drawing/2014/main" id="{9A05396D-29B9-41A6-9997-E363A9EA5C37}"/>
-              </a:ext>
-            </a:extLst>
-          </p:cNvPr>
-          <p:cNvSpPr txBox="1">
-            <a:spLocks noGrp="1"/>
-          </p:cNvSpPr>
-          <p:nvPr>
-            <p:ph idx="1"/>
-          </p:nvPr>
-        </p:nvSpPr>
-        <p:spPr>
-          <a:xfrm>
-            <a:off x="838200" y="1307466"/>
-            <a:ext cx="10977877" cy="5032373"/>
-          </a:xfrm>
-        </p:spPr>
-        <p:txBody>
-          <a:bodyPr>
-            <a:normAutofit fontScale="92500" lnSpcReduction="10000"/>
-          </a:bodyPr>
-          <a:lstStyle/>
-          <a:p>
-            <a:pPr lvl="0">
-              <a:buFont typeface="Courier New" pitchFamily="49"/>
-              <a:buChar char="_"/>
-            </a:pPr>
-            <a:r>
-              <a:rPr lang="nl-NL">
-                <a:solidFill>
-                  <a:srgbClr val="00FF00"/>
-                </a:solidFill>
-                <a:latin typeface="Courier New" pitchFamily="49"/>
-                <a:cs typeface="Courier New" pitchFamily="49"/>
-              </a:rPr>
-              <a:t>Exercises &gt; Exercises03.cs</a:t>
-            </a:r>
-            <a:endParaRPr lang="nl-NL" dirty="0">
-              <a:solidFill>
-                <a:srgbClr val="00FF00"/>
-              </a:solidFill>
-              <a:latin typeface="Courier New" pitchFamily="49"/>
-              <a:cs typeface="Courier New" pitchFamily="49"/>
-            </a:endParaRPr>
-          </a:p>
-          <a:p>
-            <a:pPr lvl="0">
-              <a:buFont typeface="Courier New" pitchFamily="49"/>
-              <a:buChar char="_"/>
-            </a:pPr>
-            <a:endParaRPr lang="nl-NL" dirty="0">
-              <a:solidFill>
-                <a:srgbClr val="00FF00"/>
-              </a:solidFill>
-              <a:latin typeface="Courier New" pitchFamily="49"/>
-              <a:cs typeface="Courier New" pitchFamily="49"/>
-            </a:endParaRPr>
-          </a:p>
-          <a:p>
-            <a:pPr lvl="0">
-              <a:buFont typeface="Courier New" pitchFamily="49"/>
-              <a:buChar char="_"/>
-            </a:pPr>
-            <a:r>
-              <a:rPr lang="nl-NL">
-                <a:solidFill>
-                  <a:srgbClr val="00FF00"/>
-                </a:solidFill>
-                <a:latin typeface="Courier New" pitchFamily="49"/>
-                <a:cs typeface="Courier New" pitchFamily="49"/>
-              </a:rPr>
-              <a:t>Create a stateful mock that exerts the described behaviour</a:t>
-            </a:r>
-          </a:p>
-          <a:p>
-            <a:pPr lvl="1">
-              <a:buFont typeface="Courier New" pitchFamily="49"/>
-              <a:buChar char="_"/>
-            </a:pPr>
-            <a:r>
-              <a:rPr lang="nl-NL">
-                <a:solidFill>
-                  <a:srgbClr val="00FF00"/>
-                </a:solidFill>
-                <a:latin typeface="Courier New" pitchFamily="49"/>
-                <a:cs typeface="Courier New" pitchFamily="49"/>
-              </a:rPr>
-              <a:t>Implement the responses as described in the comments</a:t>
-            </a:r>
-          </a:p>
-          <a:p>
-            <a:pPr lvl="0">
-              <a:buFont typeface="Courier New" pitchFamily="49"/>
-              <a:buChar char="_"/>
-            </a:pPr>
-            <a:endParaRPr lang="nl-NL" dirty="0">
-              <a:solidFill>
-                <a:srgbClr val="00FF00"/>
-              </a:solidFill>
-              <a:latin typeface="Courier New" pitchFamily="49"/>
-              <a:cs typeface="Courier New" pitchFamily="49"/>
-            </a:endParaRPr>
-          </a:p>
-          <a:p>
-            <a:pPr lvl="0">
-              <a:buFont typeface="Courier New" pitchFamily="49"/>
-              <a:buChar char="_"/>
-            </a:pPr>
-            <a:r>
-              <a:rPr lang="nl-NL" dirty="0" err="1">
-                <a:solidFill>
-                  <a:srgbClr val="00FF00"/>
-                </a:solidFill>
-                <a:latin typeface="Courier New" pitchFamily="49"/>
-                <a:cs typeface="Courier New" pitchFamily="49"/>
-              </a:rPr>
-              <a:t>Verify</a:t>
-            </a:r>
-            <a:r>
-              <a:rPr lang="nl-NL" dirty="0">
-                <a:solidFill>
-                  <a:srgbClr val="00FF00"/>
-                </a:solidFill>
-                <a:latin typeface="Courier New" pitchFamily="49"/>
-                <a:cs typeface="Courier New" pitchFamily="49"/>
-              </a:rPr>
-              <a:t> </a:t>
-            </a:r>
-            <a:r>
-              <a:rPr lang="nl-NL" dirty="0" err="1">
-                <a:solidFill>
-                  <a:srgbClr val="00FF00"/>
-                </a:solidFill>
-                <a:latin typeface="Courier New" pitchFamily="49"/>
-                <a:cs typeface="Courier New" pitchFamily="49"/>
-              </a:rPr>
-              <a:t>your</a:t>
-            </a:r>
-            <a:r>
-              <a:rPr lang="nl-NL" dirty="0">
-                <a:solidFill>
-                  <a:srgbClr val="00FF00"/>
-                </a:solidFill>
-                <a:latin typeface="Courier New" pitchFamily="49"/>
-                <a:cs typeface="Courier New" pitchFamily="49"/>
-              </a:rPr>
-              <a:t> solution </a:t>
-            </a:r>
-            <a:r>
-              <a:rPr lang="nl-NL" dirty="0" err="1">
-                <a:solidFill>
-                  <a:srgbClr val="00FF00"/>
-                </a:solidFill>
-                <a:latin typeface="Courier New" pitchFamily="49"/>
-                <a:cs typeface="Courier New" pitchFamily="49"/>
-              </a:rPr>
-              <a:t>by</a:t>
-            </a:r>
-            <a:r>
-              <a:rPr lang="nl-NL" dirty="0">
-                <a:solidFill>
-                  <a:srgbClr val="00FF00"/>
-                </a:solidFill>
-                <a:latin typeface="Courier New" pitchFamily="49"/>
-                <a:cs typeface="Courier New" pitchFamily="49"/>
-              </a:rPr>
-              <a:t> running </a:t>
-            </a:r>
-            <a:r>
-              <a:rPr lang="nl-NL" err="1">
-                <a:solidFill>
-                  <a:srgbClr val="00FF00"/>
-                </a:solidFill>
-                <a:latin typeface="Courier New" pitchFamily="49"/>
-                <a:cs typeface="Courier New" pitchFamily="49"/>
-              </a:rPr>
-              <a:t>the</a:t>
-            </a:r>
-            <a:r>
-              <a:rPr lang="nl-NL">
-                <a:solidFill>
-                  <a:srgbClr val="00FF00"/>
-                </a:solidFill>
-                <a:latin typeface="Courier New" pitchFamily="49"/>
-                <a:cs typeface="Courier New" pitchFamily="49"/>
-              </a:rPr>
-              <a:t> tests in the same class</a:t>
-            </a:r>
-          </a:p>
-          <a:p>
-            <a:pPr lvl="0">
-              <a:buFont typeface="Courier New" pitchFamily="49"/>
-              <a:buChar char="_"/>
-            </a:pPr>
-            <a:endParaRPr lang="nl-NL">
-              <a:solidFill>
-                <a:srgbClr val="00FF00"/>
-              </a:solidFill>
-              <a:latin typeface="Courier New" pitchFamily="49"/>
-              <a:cs typeface="Courier New" pitchFamily="49"/>
-            </a:endParaRPr>
-          </a:p>
-          <a:p>
-            <a:pPr lvl="0">
-              <a:buFont typeface="Courier New" pitchFamily="49"/>
-              <a:buChar char="_"/>
-            </a:pPr>
-            <a:r>
-              <a:rPr lang="nl-NL">
-                <a:solidFill>
-                  <a:srgbClr val="00FF00"/>
-                </a:solidFill>
-                <a:latin typeface="Courier New" pitchFamily="49"/>
-                <a:cs typeface="Courier New" pitchFamily="49"/>
-              </a:rPr>
-              <a:t>Answers are in Answers &gt; Answers03.cs</a:t>
-            </a:r>
-          </a:p>
-          <a:p>
-            <a:pPr lvl="0">
-              <a:buFont typeface="Courier New" pitchFamily="49"/>
-              <a:buChar char="_"/>
-            </a:pPr>
-            <a:endParaRPr lang="nl-NL">
-              <a:solidFill>
-                <a:srgbClr val="00FF00"/>
-              </a:solidFill>
-              <a:latin typeface="Courier New" pitchFamily="49"/>
-              <a:cs typeface="Courier New" pitchFamily="49"/>
-            </a:endParaRPr>
-          </a:p>
-          <a:p>
-            <a:pPr lvl="0">
-              <a:buFont typeface="Courier New" pitchFamily="49"/>
-              <a:buChar char="_"/>
-            </a:pPr>
-            <a:r>
-              <a:rPr lang="nl-NL">
-                <a:solidFill>
-                  <a:srgbClr val="00FF00"/>
-                </a:solidFill>
-                <a:latin typeface="Courier New" pitchFamily="49"/>
-                <a:cs typeface="Courier New" pitchFamily="49"/>
-              </a:rPr>
-              <a:t>Examples are in Examples &gt; Examples03.cs</a:t>
-            </a:r>
-            <a:endParaRPr lang="nl-NL" dirty="0">
-              <a:solidFill>
-                <a:srgbClr val="00FF00"/>
-              </a:solidFill>
-              <a:latin typeface="Courier New" pitchFamily="49"/>
-              <a:cs typeface="Courier New" pitchFamily="49"/>
-            </a:endParaRPr>
-          </a:p>
-          <a:p>
-            <a:pPr lvl="0">
-              <a:buFont typeface="Courier New" pitchFamily="49"/>
-              <a:buChar char="_"/>
-            </a:pPr>
-            <a:endParaRPr lang="nl-NL" dirty="0">
-              <a:solidFill>
-                <a:srgbClr val="00FF00"/>
-              </a:solidFill>
-              <a:latin typeface="Courier New" pitchFamily="49"/>
-              <a:cs typeface="Courier New" pitchFamily="49"/>
-            </a:endParaRPr>
-          </a:p>
-          <a:p>
-            <a:pPr lvl="0">
-              <a:buFont typeface="Courier New" pitchFamily="49"/>
-              <a:buChar char="_"/>
-            </a:pPr>
-            <a:endParaRPr lang="nl-NL" dirty="0">
-              <a:solidFill>
-                <a:srgbClr val="00FF00"/>
-              </a:solidFill>
-              <a:latin typeface="Courier New" pitchFamily="49"/>
-              <a:cs typeface="Courier New" pitchFamily="49"/>
-            </a:endParaRPr>
-          </a:p>
-          <a:p>
-            <a:pPr lvl="0">
-              <a:buFont typeface="Courier New" pitchFamily="49"/>
-              <a:buChar char="_"/>
-            </a:pPr>
-            <a:endParaRPr lang="nl-NL" dirty="0">
-              <a:solidFill>
-                <a:srgbClr val="00FF00"/>
-              </a:solidFill>
-              <a:latin typeface="Courier New" pitchFamily="49"/>
-              <a:cs typeface="Courier New" pitchFamily="49"/>
-            </a:endParaRPr>
-          </a:p>
-          <a:p>
-            <a:pPr lvl="0">
-              <a:buFont typeface="Courier New" pitchFamily="49"/>
-              <a:buChar char="_"/>
-            </a:pPr>
-            <a:endParaRPr lang="nl-NL" dirty="0">
-              <a:solidFill>
-                <a:srgbClr val="00FF00"/>
-              </a:solidFill>
-              <a:latin typeface="Courier New" pitchFamily="49"/>
-              <a:cs typeface="Courier New" pitchFamily="49"/>
-            </a:endParaRPr>
-          </a:p>
-          <a:p>
-            <a:pPr lvl="0">
-              <a:buFont typeface="Courier New" pitchFamily="49"/>
-              <a:buChar char="_"/>
-            </a:pPr>
-            <a:endParaRPr lang="nl-NL" dirty="0">
-              <a:solidFill>
-                <a:srgbClr val="00FF00"/>
-              </a:solidFill>
-              <a:latin typeface="Courier New" pitchFamily="49"/>
-              <a:cs typeface="Courier New" pitchFamily="49"/>
-            </a:endParaRPr>
-          </a:p>
-        </p:txBody>
-      </p:sp>
-    </p:spTree>
-    <p:extLst>
-      <p:ext uri="{BB962C8B-B14F-4D97-AF65-F5344CB8AC3E}">
-        <p14:creationId xmlns:p14="http://schemas.microsoft.com/office/powerpoint/2010/main" val="737803410"/>
-      </p:ext>
-    </p:extLst>
-  </p:cSld>
-  <p:clrMapOvr>
-    <a:masterClrMapping/>
-  </p:clrMapOvr>
-</p:sld>
-</file>
-
-<file path=ppt/slides/slide41.xml><?xml version="1.0" encoding="utf-8"?>
-<p:sld xmlns:a="http://schemas.openxmlformats.org/drawingml/2006/main" xmlns:r="http://schemas.openxmlformats.org/officeDocument/2006/relationships" xmlns:p="http://schemas.openxmlformats.org/presentationml/2006/main">
-  <p:cSld>
-    <p:bg>
-      <p:bgPr>
-        <a:solidFill>
           <a:schemeClr val="tx1"/>
         </a:solidFill>
         <a:effectLst/>
@@ -27497,7 +26654,7 @@
 </p:sld>
 </file>
 
-<file path=ppt/slides/slide42.xml><?xml version="1.0" encoding="utf-8"?>
+<file path=ppt/slides/slide41.xml><?xml version="1.0" encoding="utf-8"?>
 <p:sld xmlns:a="http://schemas.openxmlformats.org/drawingml/2006/main" xmlns:r="http://schemas.openxmlformats.org/officeDocument/2006/relationships" xmlns:p="http://schemas.openxmlformats.org/presentationml/2006/main">
   <p:cSld>
     <p:bg>
@@ -27985,7 +27142,7 @@
 </p:sld>
 </file>
 
-<file path=ppt/slides/slide43.xml><?xml version="1.0" encoding="utf-8"?>
+<file path=ppt/slides/slide42.xml><?xml version="1.0" encoding="utf-8"?>
 <p:sld xmlns:a="http://schemas.openxmlformats.org/drawingml/2006/main" xmlns:r="http://schemas.openxmlformats.org/officeDocument/2006/relationships" xmlns:p="http://schemas.openxmlformats.org/presentationml/2006/main">
   <p:cSld>
     <p:bg>
@@ -28817,7 +27974,7 @@
 </p:sld>
 </file>
 
-<file path=ppt/slides/slide44.xml><?xml version="1.0" encoding="utf-8"?>
+<file path=ppt/slides/slide43.xml><?xml version="1.0" encoding="utf-8"?>
 <p:sld xmlns:a="http://schemas.openxmlformats.org/drawingml/2006/main" xmlns:r="http://schemas.openxmlformats.org/officeDocument/2006/relationships" xmlns:p="http://schemas.openxmlformats.org/presentationml/2006/main">
   <p:cSld>
     <p:bg>
@@ -29434,7 +28591,7 @@
 </p:sld>
 </file>
 
-<file path=ppt/slides/slide45.xml><?xml version="1.0" encoding="utf-8"?>
+<file path=ppt/slides/slide44.xml><?xml version="1.0" encoding="utf-8"?>
 <p:sld xmlns:a="http://schemas.openxmlformats.org/drawingml/2006/main" xmlns:r="http://schemas.openxmlformats.org/officeDocument/2006/relationships" xmlns:p="http://schemas.openxmlformats.org/presentationml/2006/main">
   <p:cSld>
     <p:bg>
@@ -30112,7 +29269,7 @@
 </p:sld>
 </file>
 
-<file path=ppt/slides/slide46.xml><?xml version="1.0" encoding="utf-8"?>
+<file path=ppt/slides/slide45.xml><?xml version="1.0" encoding="utf-8"?>
 <p:sld xmlns:a="http://schemas.openxmlformats.org/drawingml/2006/main" xmlns:r="http://schemas.openxmlformats.org/officeDocument/2006/relationships" xmlns:p="http://schemas.openxmlformats.org/presentationml/2006/main">
   <p:cSld>
     <p:bg>
@@ -30523,7 +29680,7 @@
 </p:sld>
 </file>
 
-<file path=ppt/slides/slide47.xml><?xml version="1.0" encoding="utf-8"?>
+<file path=ppt/slides/slide46.xml><?xml version="1.0" encoding="utf-8"?>
 <p:sld xmlns:a="http://schemas.openxmlformats.org/drawingml/2006/main" xmlns:r="http://schemas.openxmlformats.org/officeDocument/2006/relationships" xmlns:p="http://schemas.openxmlformats.org/presentationml/2006/main">
   <p:cSld>
     <p:bg>

</xml_diff>